<commit_message>
Tür dönüşümü sunumu güncellendi
</commit_message>
<xml_diff>
--- a/Tür Dönüşümü.pptx
+++ b/Tür Dönüşümü.pptx
@@ -5,7 +5,7 @@
     <p:sldMasterId id="2147483672" r:id="rId1"/>
   </p:sldMasterIdLst>
   <p:notesMasterIdLst>
-    <p:notesMasterId r:id="rId13"/>
+    <p:notesMasterId r:id="rId17"/>
   </p:notesMasterIdLst>
   <p:sldIdLst>
     <p:sldId id="256" r:id="rId2"/>
@@ -18,34 +18,38 @@
     <p:sldId id="345" r:id="rId9"/>
     <p:sldId id="346" r:id="rId10"/>
     <p:sldId id="347" r:id="rId11"/>
-    <p:sldId id="281" r:id="rId12"/>
+    <p:sldId id="348" r:id="rId12"/>
+    <p:sldId id="349" r:id="rId13"/>
+    <p:sldId id="350" r:id="rId14"/>
+    <p:sldId id="351" r:id="rId15"/>
+    <p:sldId id="281" r:id="rId16"/>
   </p:sldIdLst>
   <p:sldSz cx="9144000" cy="5143500" type="screen16x9"/>
   <p:notesSz cx="9144000" cy="6858000"/>
   <p:embeddedFontLst>
     <p:embeddedFont>
       <p:font typeface="Anaheim" panose="020B0604020202020204" charset="0"/>
-      <p:regular r:id="rId14"/>
+      <p:regular r:id="rId18"/>
     </p:embeddedFont>
     <p:embeddedFont>
       <p:font typeface="Cascadia Mono" panose="020B0609020000020004" pitchFamily="49" charset="0"/>
-      <p:regular r:id="rId15"/>
-      <p:bold r:id="rId16"/>
-    </p:embeddedFont>
-    <p:embeddedFont>
-      <p:font typeface="Nunito Light" pitchFamily="2" charset="0"/>
-      <p:regular r:id="rId17"/>
-      <p:italic r:id="rId18"/>
-    </p:embeddedFont>
-    <p:embeddedFont>
-      <p:font typeface="Overpass Mono" panose="020B0604020202020204" charset="0"/>
       <p:regular r:id="rId19"/>
       <p:bold r:id="rId20"/>
     </p:embeddedFont>
     <p:embeddedFont>
+      <p:font typeface="Nunito Light" pitchFamily="2" charset="0"/>
+      <p:regular r:id="rId21"/>
+      <p:italic r:id="rId22"/>
+    </p:embeddedFont>
+    <p:embeddedFont>
+      <p:font typeface="Overpass Mono" panose="020B0604020202020204" charset="0"/>
+      <p:regular r:id="rId23"/>
+      <p:bold r:id="rId24"/>
+    </p:embeddedFont>
+    <p:embeddedFont>
       <p:font typeface="Raleway SemiBold" pitchFamily="2" charset="0"/>
-      <p:bold r:id="rId21"/>
-      <p:boldItalic r:id="rId22"/>
+      <p:bold r:id="rId25"/>
+      <p:boldItalic r:id="rId26"/>
     </p:embeddedFont>
   </p:embeddedFontLst>
   <p:defaultTextStyle>
@@ -1289,6 +1293,1024 @@
 </file>
 
 <file path=ppt/notesSlides/notesSlide11.xml><?xml version="1.0" encoding="utf-8"?>
+<p:notes xmlns:a="http://schemas.openxmlformats.org/drawingml/2006/main" xmlns:r="http://schemas.openxmlformats.org/officeDocument/2006/relationships" xmlns:p="http://schemas.openxmlformats.org/presentationml/2006/main">
+  <p:cSld>
+    <p:spTree>
+      <p:nvGrpSpPr>
+        <p:cNvPr id="1" name=""/>
+        <p:cNvGrpSpPr/>
+        <p:nvPr/>
+      </p:nvGrpSpPr>
+      <p:grpSpPr>
+        <a:xfrm>
+          <a:off x="0" y="0"/>
+          <a:ext cx="0" cy="0"/>
+          <a:chOff x="0" y="0"/>
+          <a:chExt cx="0" cy="0"/>
+        </a:xfrm>
+      </p:grpSpPr>
+      <p:sp>
+        <p:nvSpPr>
+          <p:cNvPr id="2" name="Slayt Resmi Yer Tutucusu 1"/>
+          <p:cNvSpPr>
+            <a:spLocks noGrp="1" noRot="1" noChangeAspect="1"/>
+          </p:cNvSpPr>
+          <p:nvPr>
+            <p:ph type="sldImg"/>
+          </p:nvPr>
+        </p:nvSpPr>
+        <p:spPr/>
+      </p:sp>
+      <p:sp>
+        <p:nvSpPr>
+          <p:cNvPr id="3" name="Not Yer Tutucusu 2"/>
+          <p:cNvSpPr>
+            <a:spLocks noGrp="1"/>
+          </p:cNvSpPr>
+          <p:nvPr>
+            <p:ph type="body" idx="1"/>
+          </p:nvPr>
+        </p:nvSpPr>
+        <p:spPr/>
+        <p:txBody>
+          <a:bodyPr/>
+          <a:lstStyle/>
+          <a:p>
+            <a:pPr marL="158750" indent="0">
+              <a:buNone/>
+            </a:pPr>
+            <a:r>
+              <a:rPr lang="tr-TR" sz="1800" dirty="0" err="1">
+                <a:solidFill>
+                  <a:srgbClr val="0000FF"/>
+                </a:solidFill>
+                <a:latin typeface="Cascadia Mono" panose="020B0609020000020004" pitchFamily="49" charset="0"/>
+              </a:rPr>
+              <a:t>using</a:t>
+            </a:r>
+            <a:r>
+              <a:rPr lang="tr-TR" sz="1800" dirty="0">
+                <a:solidFill>
+                  <a:srgbClr val="000000"/>
+                </a:solidFill>
+                <a:latin typeface="Cascadia Mono" panose="020B0609020000020004" pitchFamily="49" charset="0"/>
+              </a:rPr>
+              <a:t> </a:t>
+            </a:r>
+            <a:r>
+              <a:rPr lang="tr-TR" sz="1800" dirty="0" err="1">
+                <a:solidFill>
+                  <a:srgbClr val="000000"/>
+                </a:solidFill>
+                <a:latin typeface="Cascadia Mono" panose="020B0609020000020004" pitchFamily="49" charset="0"/>
+              </a:rPr>
+              <a:t>System</a:t>
+            </a:r>
+            <a:r>
+              <a:rPr lang="tr-TR" sz="1800" dirty="0">
+                <a:solidFill>
+                  <a:srgbClr val="000000"/>
+                </a:solidFill>
+                <a:latin typeface="Cascadia Mono" panose="020B0609020000020004" pitchFamily="49" charset="0"/>
+              </a:rPr>
+              <a:t>;</a:t>
+            </a:r>
+          </a:p>
+          <a:p>
+            <a:pPr marL="158750" indent="0">
+              <a:buNone/>
+            </a:pPr>
+            <a:r>
+              <a:rPr lang="tr-TR" sz="1800" dirty="0" err="1">
+                <a:solidFill>
+                  <a:srgbClr val="0000FF"/>
+                </a:solidFill>
+                <a:latin typeface="Cascadia Mono" panose="020B0609020000020004" pitchFamily="49" charset="0"/>
+              </a:rPr>
+              <a:t>class</a:t>
+            </a:r>
+            <a:r>
+              <a:rPr lang="tr-TR" sz="1800" dirty="0">
+                <a:solidFill>
+                  <a:srgbClr val="000000"/>
+                </a:solidFill>
+                <a:latin typeface="Cascadia Mono" panose="020B0609020000020004" pitchFamily="49" charset="0"/>
+              </a:rPr>
+              <a:t> </a:t>
+            </a:r>
+            <a:r>
+              <a:rPr lang="tr-TR" sz="1800" dirty="0">
+                <a:solidFill>
+                  <a:srgbClr val="2B91AF"/>
+                </a:solidFill>
+                <a:latin typeface="Cascadia Mono" panose="020B0609020000020004" pitchFamily="49" charset="0"/>
+              </a:rPr>
+              <a:t>TurDonusumu4</a:t>
+            </a:r>
+            <a:endParaRPr lang="tr-TR" sz="1800" dirty="0">
+              <a:solidFill>
+                <a:srgbClr val="000000"/>
+              </a:solidFill>
+              <a:latin typeface="Cascadia Mono" panose="020B0609020000020004" pitchFamily="49" charset="0"/>
+            </a:endParaRPr>
+          </a:p>
+          <a:p>
+            <a:pPr marL="158750" indent="0">
+              <a:buNone/>
+            </a:pPr>
+            <a:r>
+              <a:rPr lang="tr-TR" sz="1800" dirty="0">
+                <a:solidFill>
+                  <a:srgbClr val="000000"/>
+                </a:solidFill>
+                <a:latin typeface="Cascadia Mono" panose="020B0609020000020004" pitchFamily="49" charset="0"/>
+              </a:rPr>
+              <a:t>{</a:t>
+            </a:r>
+          </a:p>
+          <a:p>
+            <a:pPr marL="158750" indent="0">
+              <a:buNone/>
+            </a:pPr>
+            <a:r>
+              <a:rPr lang="tr-TR" sz="1800" dirty="0">
+                <a:solidFill>
+                  <a:srgbClr val="000000"/>
+                </a:solidFill>
+                <a:latin typeface="Cascadia Mono" panose="020B0609020000020004" pitchFamily="49" charset="0"/>
+              </a:rPr>
+              <a:t>    </a:t>
+            </a:r>
+            <a:r>
+              <a:rPr lang="tr-TR" sz="1800" dirty="0" err="1">
+                <a:solidFill>
+                  <a:srgbClr val="0000FF"/>
+                </a:solidFill>
+                <a:latin typeface="Cascadia Mono" panose="020B0609020000020004" pitchFamily="49" charset="0"/>
+              </a:rPr>
+              <a:t>static</a:t>
+            </a:r>
+            <a:r>
+              <a:rPr lang="tr-TR" sz="1800" dirty="0">
+                <a:solidFill>
+                  <a:srgbClr val="000000"/>
+                </a:solidFill>
+                <a:latin typeface="Cascadia Mono" panose="020B0609020000020004" pitchFamily="49" charset="0"/>
+              </a:rPr>
+              <a:t> </a:t>
+            </a:r>
+            <a:r>
+              <a:rPr lang="tr-TR" sz="1800" dirty="0" err="1">
+                <a:solidFill>
+                  <a:srgbClr val="0000FF"/>
+                </a:solidFill>
+                <a:latin typeface="Cascadia Mono" panose="020B0609020000020004" pitchFamily="49" charset="0"/>
+              </a:rPr>
+              <a:t>void</a:t>
+            </a:r>
+            <a:r>
+              <a:rPr lang="tr-TR" sz="1800" dirty="0">
+                <a:solidFill>
+                  <a:srgbClr val="000000"/>
+                </a:solidFill>
+                <a:latin typeface="Cascadia Mono" panose="020B0609020000020004" pitchFamily="49" charset="0"/>
+              </a:rPr>
+              <a:t> Main()</a:t>
+            </a:r>
+          </a:p>
+          <a:p>
+            <a:pPr marL="158750" indent="0">
+              <a:buNone/>
+            </a:pPr>
+            <a:r>
+              <a:rPr lang="tr-TR" sz="1800" dirty="0">
+                <a:solidFill>
+                  <a:srgbClr val="000000"/>
+                </a:solidFill>
+                <a:latin typeface="Cascadia Mono" panose="020B0609020000020004" pitchFamily="49" charset="0"/>
+              </a:rPr>
+              <a:t>    {</a:t>
+            </a:r>
+          </a:p>
+          <a:p>
+            <a:pPr marL="158750" indent="0">
+              <a:buNone/>
+            </a:pPr>
+            <a:r>
+              <a:rPr lang="tr-TR" sz="1800" dirty="0">
+                <a:solidFill>
+                  <a:srgbClr val="000000"/>
+                </a:solidFill>
+                <a:latin typeface="Cascadia Mono" panose="020B0609020000020004" pitchFamily="49" charset="0"/>
+              </a:rPr>
+              <a:t>        </a:t>
+            </a:r>
+            <a:r>
+              <a:rPr lang="tr-TR" sz="1800" dirty="0" err="1">
+                <a:solidFill>
+                  <a:srgbClr val="0000FF"/>
+                </a:solidFill>
+                <a:latin typeface="Cascadia Mono" panose="020B0609020000020004" pitchFamily="49" charset="0"/>
+              </a:rPr>
+              <a:t>byte</a:t>
+            </a:r>
+            <a:r>
+              <a:rPr lang="tr-TR" sz="1800" dirty="0">
+                <a:solidFill>
+                  <a:srgbClr val="000000"/>
+                </a:solidFill>
+                <a:latin typeface="Cascadia Mono" panose="020B0609020000020004" pitchFamily="49" charset="0"/>
+              </a:rPr>
+              <a:t> a = 5;</a:t>
+            </a:r>
+          </a:p>
+          <a:p>
+            <a:pPr marL="158750" indent="0">
+              <a:buNone/>
+            </a:pPr>
+            <a:r>
+              <a:rPr lang="tr-TR" sz="1800" dirty="0">
+                <a:solidFill>
+                  <a:srgbClr val="000000"/>
+                </a:solidFill>
+                <a:latin typeface="Cascadia Mono" panose="020B0609020000020004" pitchFamily="49" charset="0"/>
+              </a:rPr>
+              <a:t>        </a:t>
+            </a:r>
+            <a:r>
+              <a:rPr lang="tr-TR" sz="1800" dirty="0" err="1">
+                <a:solidFill>
+                  <a:srgbClr val="0000FF"/>
+                </a:solidFill>
+                <a:latin typeface="Cascadia Mono" panose="020B0609020000020004" pitchFamily="49" charset="0"/>
+              </a:rPr>
+              <a:t>byte</a:t>
+            </a:r>
+            <a:r>
+              <a:rPr lang="tr-TR" sz="1800" dirty="0">
+                <a:solidFill>
+                  <a:srgbClr val="000000"/>
+                </a:solidFill>
+                <a:latin typeface="Cascadia Mono" panose="020B0609020000020004" pitchFamily="49" charset="0"/>
+              </a:rPr>
+              <a:t> b = 10;</a:t>
+            </a:r>
+          </a:p>
+          <a:p>
+            <a:pPr marL="158750" indent="0">
+              <a:buNone/>
+            </a:pPr>
+            <a:r>
+              <a:rPr lang="tr-TR" sz="1800" dirty="0">
+                <a:solidFill>
+                  <a:srgbClr val="000000"/>
+                </a:solidFill>
+                <a:latin typeface="Cascadia Mono" panose="020B0609020000020004" pitchFamily="49" charset="0"/>
+              </a:rPr>
+              <a:t>        </a:t>
+            </a:r>
+            <a:r>
+              <a:rPr lang="tr-TR" sz="1800" dirty="0">
+                <a:solidFill>
+                  <a:srgbClr val="008000"/>
+                </a:solidFill>
+                <a:latin typeface="Cascadia Mono" panose="020B0609020000020004" pitchFamily="49" charset="0"/>
+              </a:rPr>
+              <a:t>//</a:t>
+            </a:r>
+            <a:r>
+              <a:rPr lang="tr-TR" sz="1800" dirty="0" err="1">
+                <a:solidFill>
+                  <a:srgbClr val="008000"/>
+                </a:solidFill>
+                <a:latin typeface="Cascadia Mono" panose="020B0609020000020004" pitchFamily="49" charset="0"/>
+              </a:rPr>
+              <a:t>byte</a:t>
+            </a:r>
+            <a:r>
+              <a:rPr lang="tr-TR" sz="1800" dirty="0">
+                <a:solidFill>
+                  <a:srgbClr val="008000"/>
+                </a:solidFill>
+                <a:latin typeface="Cascadia Mono" panose="020B0609020000020004" pitchFamily="49" charset="0"/>
+              </a:rPr>
+              <a:t> c = a + b; ifadesinde </a:t>
+            </a:r>
+            <a:r>
+              <a:rPr lang="tr-TR" sz="1800" dirty="0" err="1">
+                <a:solidFill>
+                  <a:srgbClr val="008000"/>
+                </a:solidFill>
+                <a:latin typeface="Cascadia Mono" panose="020B0609020000020004" pitchFamily="49" charset="0"/>
+              </a:rPr>
+              <a:t>byte</a:t>
+            </a:r>
+            <a:r>
+              <a:rPr lang="tr-TR" sz="1800" dirty="0">
+                <a:solidFill>
+                  <a:srgbClr val="008000"/>
+                </a:solidFill>
+                <a:latin typeface="Cascadia Mono" panose="020B0609020000020004" pitchFamily="49" charset="0"/>
+              </a:rPr>
+              <a:t> yerine </a:t>
+            </a:r>
+            <a:r>
+              <a:rPr lang="tr-TR" sz="1800" dirty="0" err="1">
+                <a:solidFill>
+                  <a:srgbClr val="008000"/>
+                </a:solidFill>
+                <a:latin typeface="Cascadia Mono" panose="020B0609020000020004" pitchFamily="49" charset="0"/>
+              </a:rPr>
+              <a:t>int</a:t>
+            </a:r>
+            <a:r>
+              <a:rPr lang="tr-TR" sz="1800" dirty="0">
+                <a:solidFill>
+                  <a:srgbClr val="008000"/>
+                </a:solidFill>
+                <a:latin typeface="Cascadia Mono" panose="020B0609020000020004" pitchFamily="49" charset="0"/>
+              </a:rPr>
+              <a:t> yazılırsa hata düzelir</a:t>
+            </a:r>
+            <a:endParaRPr lang="tr-TR" sz="1800" dirty="0">
+              <a:solidFill>
+                <a:srgbClr val="000000"/>
+              </a:solidFill>
+              <a:latin typeface="Cascadia Mono" panose="020B0609020000020004" pitchFamily="49" charset="0"/>
+            </a:endParaRPr>
+          </a:p>
+          <a:p>
+            <a:pPr marL="158750" indent="0">
+              <a:buNone/>
+            </a:pPr>
+            <a:r>
+              <a:rPr lang="en-US" sz="1800" dirty="0">
+                <a:solidFill>
+                  <a:srgbClr val="000000"/>
+                </a:solidFill>
+                <a:latin typeface="Cascadia Mono" panose="020B0609020000020004" pitchFamily="49" charset="0"/>
+              </a:rPr>
+              <a:t>        </a:t>
+            </a:r>
+            <a:r>
+              <a:rPr lang="en-US" sz="1800" dirty="0">
+                <a:solidFill>
+                  <a:srgbClr val="008000"/>
+                </a:solidFill>
+                <a:latin typeface="Cascadia Mono" panose="020B0609020000020004" pitchFamily="49" charset="0"/>
+              </a:rPr>
+              <a:t>//cannot implicitly convert type int to byte</a:t>
+            </a:r>
+            <a:endParaRPr lang="en-US" sz="1800" dirty="0">
+              <a:solidFill>
+                <a:srgbClr val="000000"/>
+              </a:solidFill>
+              <a:latin typeface="Cascadia Mono" panose="020B0609020000020004" pitchFamily="49" charset="0"/>
+            </a:endParaRPr>
+          </a:p>
+          <a:p>
+            <a:pPr marL="158750" indent="0">
+              <a:buNone/>
+            </a:pPr>
+            <a:r>
+              <a:rPr lang="tr-TR" sz="1800" dirty="0">
+                <a:solidFill>
+                  <a:srgbClr val="000000"/>
+                </a:solidFill>
+                <a:latin typeface="Cascadia Mono" panose="020B0609020000020004" pitchFamily="49" charset="0"/>
+              </a:rPr>
+              <a:t>        </a:t>
+            </a:r>
+            <a:r>
+              <a:rPr lang="tr-TR" sz="1800" dirty="0">
+                <a:solidFill>
+                  <a:srgbClr val="008000"/>
+                </a:solidFill>
+                <a:latin typeface="Cascadia Mono" panose="020B0609020000020004" pitchFamily="49" charset="0"/>
+              </a:rPr>
+              <a:t>//</a:t>
+            </a:r>
+            <a:r>
+              <a:rPr lang="tr-TR" sz="1800" dirty="0" err="1">
+                <a:solidFill>
+                  <a:srgbClr val="008000"/>
+                </a:solidFill>
+                <a:latin typeface="Cascadia Mono" panose="020B0609020000020004" pitchFamily="49" charset="0"/>
+              </a:rPr>
+              <a:t>int</a:t>
+            </a:r>
+            <a:r>
+              <a:rPr lang="tr-TR" sz="1800" dirty="0">
+                <a:solidFill>
+                  <a:srgbClr val="008000"/>
+                </a:solidFill>
+                <a:latin typeface="Cascadia Mono" panose="020B0609020000020004" pitchFamily="49" charset="0"/>
+              </a:rPr>
+              <a:t> türü </a:t>
+            </a:r>
+            <a:r>
+              <a:rPr lang="tr-TR" sz="1800" dirty="0" err="1">
+                <a:solidFill>
+                  <a:srgbClr val="008000"/>
+                </a:solidFill>
+                <a:latin typeface="Cascadia Mono" panose="020B0609020000020004" pitchFamily="49" charset="0"/>
+              </a:rPr>
+              <a:t>byte</a:t>
+            </a:r>
+            <a:r>
+              <a:rPr lang="tr-TR" sz="1800" dirty="0">
+                <a:solidFill>
+                  <a:srgbClr val="008000"/>
+                </a:solidFill>
+                <a:latin typeface="Cascadia Mono" panose="020B0609020000020004" pitchFamily="49" charset="0"/>
+              </a:rPr>
+              <a:t> türüne </a:t>
+            </a:r>
+            <a:r>
+              <a:rPr lang="tr-TR" sz="1800" dirty="0" err="1">
+                <a:solidFill>
+                  <a:srgbClr val="008000"/>
+                </a:solidFill>
+                <a:latin typeface="Cascadia Mono" panose="020B0609020000020004" pitchFamily="49" charset="0"/>
+              </a:rPr>
+              <a:t>bilincsiz</a:t>
+            </a:r>
+            <a:r>
+              <a:rPr lang="tr-TR" sz="1800" dirty="0">
+                <a:solidFill>
+                  <a:srgbClr val="008000"/>
+                </a:solidFill>
+                <a:latin typeface="Cascadia Mono" panose="020B0609020000020004" pitchFamily="49" charset="0"/>
+              </a:rPr>
+              <a:t> olarak </a:t>
+            </a:r>
+            <a:r>
+              <a:rPr lang="tr-TR" sz="1800" dirty="0" err="1">
+                <a:solidFill>
+                  <a:srgbClr val="008000"/>
+                </a:solidFill>
+                <a:latin typeface="Cascadia Mono" panose="020B0609020000020004" pitchFamily="49" charset="0"/>
+              </a:rPr>
+              <a:t>dönüstürülemedi</a:t>
+            </a:r>
+            <a:endParaRPr lang="tr-TR" sz="1800" dirty="0">
+              <a:solidFill>
+                <a:srgbClr val="000000"/>
+              </a:solidFill>
+              <a:latin typeface="Cascadia Mono" panose="020B0609020000020004" pitchFamily="49" charset="0"/>
+            </a:endParaRPr>
+          </a:p>
+          <a:p>
+            <a:pPr marL="158750" indent="0">
+              <a:buNone/>
+            </a:pPr>
+            <a:r>
+              <a:rPr lang="tr-TR" sz="1800" dirty="0">
+                <a:solidFill>
+                  <a:srgbClr val="000000"/>
+                </a:solidFill>
+                <a:latin typeface="Cascadia Mono" panose="020B0609020000020004" pitchFamily="49" charset="0"/>
+              </a:rPr>
+              <a:t>        </a:t>
+            </a:r>
+            <a:r>
+              <a:rPr lang="tr-TR" sz="1800" dirty="0" err="1">
+                <a:solidFill>
+                  <a:srgbClr val="0000FF"/>
+                </a:solidFill>
+                <a:latin typeface="Cascadia Mono" panose="020B0609020000020004" pitchFamily="49" charset="0"/>
+              </a:rPr>
+              <a:t>byte</a:t>
+            </a:r>
+            <a:r>
+              <a:rPr lang="tr-TR" sz="1800" dirty="0">
+                <a:solidFill>
+                  <a:srgbClr val="000000"/>
+                </a:solidFill>
+                <a:latin typeface="Cascadia Mono" panose="020B0609020000020004" pitchFamily="49" charset="0"/>
+              </a:rPr>
+              <a:t> c = a + b;</a:t>
+            </a:r>
+          </a:p>
+          <a:p>
+            <a:pPr marL="158750" indent="0">
+              <a:buNone/>
+            </a:pPr>
+            <a:r>
+              <a:rPr lang="tr-TR" sz="1800" dirty="0">
+                <a:solidFill>
+                  <a:srgbClr val="000000"/>
+                </a:solidFill>
+                <a:latin typeface="Cascadia Mono" panose="020B0609020000020004" pitchFamily="49" charset="0"/>
+              </a:rPr>
+              <a:t>        </a:t>
+            </a:r>
+            <a:r>
+              <a:rPr lang="tr-TR" sz="1800" dirty="0" err="1">
+                <a:solidFill>
+                  <a:srgbClr val="000000"/>
+                </a:solidFill>
+                <a:latin typeface="Cascadia Mono" panose="020B0609020000020004" pitchFamily="49" charset="0"/>
+              </a:rPr>
+              <a:t>Console.WriteLine</a:t>
+            </a:r>
+            <a:r>
+              <a:rPr lang="tr-TR" sz="1800" dirty="0">
+                <a:solidFill>
+                  <a:srgbClr val="000000"/>
+                </a:solidFill>
+                <a:latin typeface="Cascadia Mono" panose="020B0609020000020004" pitchFamily="49" charset="0"/>
+              </a:rPr>
+              <a:t>(c);</a:t>
+            </a:r>
+          </a:p>
+          <a:p>
+            <a:pPr marL="158750" indent="0">
+              <a:buNone/>
+            </a:pPr>
+            <a:r>
+              <a:rPr lang="tr-TR" sz="1800" dirty="0">
+                <a:solidFill>
+                  <a:srgbClr val="000000"/>
+                </a:solidFill>
+                <a:latin typeface="Cascadia Mono" panose="020B0609020000020004" pitchFamily="49" charset="0"/>
+              </a:rPr>
+              <a:t>    }</a:t>
+            </a:r>
+          </a:p>
+          <a:p>
+            <a:pPr marL="158750" indent="0">
+              <a:buNone/>
+            </a:pPr>
+            <a:r>
+              <a:rPr lang="tr-TR" sz="1800" dirty="0">
+                <a:solidFill>
+                  <a:srgbClr val="000000"/>
+                </a:solidFill>
+                <a:latin typeface="Cascadia Mono" panose="020B0609020000020004" pitchFamily="49" charset="0"/>
+              </a:rPr>
+              <a:t>}</a:t>
+            </a:r>
+          </a:p>
+          <a:p>
+            <a:pPr marL="158750" indent="0">
+              <a:buNone/>
+            </a:pPr>
+            <a:endParaRPr lang="tr-TR" dirty="0"/>
+          </a:p>
+        </p:txBody>
+      </p:sp>
+    </p:spTree>
+    <p:extLst>
+      <p:ext uri="{BB962C8B-B14F-4D97-AF65-F5344CB8AC3E}">
+        <p14:creationId xmlns:p14="http://schemas.microsoft.com/office/powerpoint/2010/main" val="3340292598"/>
+      </p:ext>
+    </p:extLst>
+  </p:cSld>
+  <p:clrMapOvr>
+    <a:masterClrMapping/>
+  </p:clrMapOvr>
+</p:notes>
+</file>
+
+<file path=ppt/notesSlides/notesSlide12.xml><?xml version="1.0" encoding="utf-8"?>
+<p:notes xmlns:a="http://schemas.openxmlformats.org/drawingml/2006/main" xmlns:r="http://schemas.openxmlformats.org/officeDocument/2006/relationships" xmlns:p="http://schemas.openxmlformats.org/presentationml/2006/main">
+  <p:cSld>
+    <p:spTree>
+      <p:nvGrpSpPr>
+        <p:cNvPr id="1" name=""/>
+        <p:cNvGrpSpPr/>
+        <p:nvPr/>
+      </p:nvGrpSpPr>
+      <p:grpSpPr>
+        <a:xfrm>
+          <a:off x="0" y="0"/>
+          <a:ext cx="0" cy="0"/>
+          <a:chOff x="0" y="0"/>
+          <a:chExt cx="0" cy="0"/>
+        </a:xfrm>
+      </p:grpSpPr>
+      <p:sp>
+        <p:nvSpPr>
+          <p:cNvPr id="2" name="Slayt Resmi Yer Tutucusu 1"/>
+          <p:cNvSpPr>
+            <a:spLocks noGrp="1" noRot="1" noChangeAspect="1"/>
+          </p:cNvSpPr>
+          <p:nvPr>
+            <p:ph type="sldImg"/>
+          </p:nvPr>
+        </p:nvSpPr>
+        <p:spPr/>
+      </p:sp>
+      <p:sp>
+        <p:nvSpPr>
+          <p:cNvPr id="3" name="Not Yer Tutucusu 2"/>
+          <p:cNvSpPr>
+            <a:spLocks noGrp="1"/>
+          </p:cNvSpPr>
+          <p:nvPr>
+            <p:ph type="body" idx="1"/>
+          </p:nvPr>
+        </p:nvSpPr>
+        <p:spPr/>
+        <p:txBody>
+          <a:bodyPr/>
+          <a:lstStyle/>
+          <a:p>
+            <a:pPr marL="158750" indent="0">
+              <a:buNone/>
+            </a:pPr>
+            <a:r>
+              <a:rPr lang="tr-TR" sz="1800" dirty="0" err="1">
+                <a:solidFill>
+                  <a:srgbClr val="0000FF"/>
+                </a:solidFill>
+                <a:latin typeface="Cascadia Mono" panose="020B0609020000020004" pitchFamily="49" charset="0"/>
+              </a:rPr>
+              <a:t>using</a:t>
+            </a:r>
+            <a:r>
+              <a:rPr lang="tr-TR" sz="1800" dirty="0">
+                <a:solidFill>
+                  <a:srgbClr val="000000"/>
+                </a:solidFill>
+                <a:latin typeface="Cascadia Mono" panose="020B0609020000020004" pitchFamily="49" charset="0"/>
+              </a:rPr>
+              <a:t> </a:t>
+            </a:r>
+            <a:r>
+              <a:rPr lang="tr-TR" sz="1800" dirty="0" err="1">
+                <a:solidFill>
+                  <a:srgbClr val="000000"/>
+                </a:solidFill>
+                <a:latin typeface="Cascadia Mono" panose="020B0609020000020004" pitchFamily="49" charset="0"/>
+              </a:rPr>
+              <a:t>System</a:t>
+            </a:r>
+            <a:r>
+              <a:rPr lang="tr-TR" sz="1800" dirty="0">
+                <a:solidFill>
+                  <a:srgbClr val="000000"/>
+                </a:solidFill>
+                <a:latin typeface="Cascadia Mono" panose="020B0609020000020004" pitchFamily="49" charset="0"/>
+              </a:rPr>
+              <a:t>;</a:t>
+            </a:r>
+          </a:p>
+          <a:p>
+            <a:pPr marL="158750" indent="0">
+              <a:buNone/>
+            </a:pPr>
+            <a:r>
+              <a:rPr lang="en-US" sz="1800" dirty="0">
+                <a:solidFill>
+                  <a:srgbClr val="0000FF"/>
+                </a:solidFill>
+                <a:latin typeface="Cascadia Mono" panose="020B0609020000020004" pitchFamily="49" charset="0"/>
+              </a:rPr>
+              <a:t>class</a:t>
+            </a:r>
+            <a:r>
+              <a:rPr lang="en-US" sz="1800" dirty="0">
+                <a:solidFill>
+                  <a:srgbClr val="000000"/>
+                </a:solidFill>
+                <a:latin typeface="Cascadia Mono" panose="020B0609020000020004" pitchFamily="49" charset="0"/>
+              </a:rPr>
+              <a:t> </a:t>
+            </a:r>
+            <a:r>
+              <a:rPr lang="en-US" sz="1800" dirty="0" err="1">
+                <a:solidFill>
+                  <a:srgbClr val="2B91AF"/>
+                </a:solidFill>
+                <a:latin typeface="Cascadia Mono" panose="020B0609020000020004" pitchFamily="49" charset="0"/>
+              </a:rPr>
+              <a:t>byte_turu_sinir_asimi</a:t>
+            </a:r>
+            <a:endParaRPr lang="en-US" sz="1800" dirty="0">
+              <a:solidFill>
+                <a:srgbClr val="000000"/>
+              </a:solidFill>
+              <a:latin typeface="Cascadia Mono" panose="020B0609020000020004" pitchFamily="49" charset="0"/>
+            </a:endParaRPr>
+          </a:p>
+          <a:p>
+            <a:pPr marL="158750" indent="0">
+              <a:buNone/>
+            </a:pPr>
+            <a:r>
+              <a:rPr lang="tr-TR" sz="1800" dirty="0">
+                <a:solidFill>
+                  <a:srgbClr val="000000"/>
+                </a:solidFill>
+                <a:latin typeface="Cascadia Mono" panose="020B0609020000020004" pitchFamily="49" charset="0"/>
+              </a:rPr>
+              <a:t>{</a:t>
+            </a:r>
+          </a:p>
+          <a:p>
+            <a:pPr marL="158750" indent="0">
+              <a:buNone/>
+            </a:pPr>
+            <a:r>
+              <a:rPr lang="tr-TR" sz="1800" dirty="0">
+                <a:solidFill>
+                  <a:srgbClr val="000000"/>
+                </a:solidFill>
+                <a:latin typeface="Cascadia Mono" panose="020B0609020000020004" pitchFamily="49" charset="0"/>
+              </a:rPr>
+              <a:t>    </a:t>
+            </a:r>
+            <a:r>
+              <a:rPr lang="tr-TR" sz="1800" dirty="0" err="1">
+                <a:solidFill>
+                  <a:srgbClr val="0000FF"/>
+                </a:solidFill>
+                <a:latin typeface="Cascadia Mono" panose="020B0609020000020004" pitchFamily="49" charset="0"/>
+              </a:rPr>
+              <a:t>static</a:t>
+            </a:r>
+            <a:r>
+              <a:rPr lang="tr-TR" sz="1800" dirty="0">
+                <a:solidFill>
+                  <a:srgbClr val="000000"/>
+                </a:solidFill>
+                <a:latin typeface="Cascadia Mono" panose="020B0609020000020004" pitchFamily="49" charset="0"/>
+              </a:rPr>
+              <a:t> </a:t>
+            </a:r>
+            <a:r>
+              <a:rPr lang="tr-TR" sz="1800" dirty="0" err="1">
+                <a:solidFill>
+                  <a:srgbClr val="0000FF"/>
+                </a:solidFill>
+                <a:latin typeface="Cascadia Mono" panose="020B0609020000020004" pitchFamily="49" charset="0"/>
+              </a:rPr>
+              <a:t>void</a:t>
+            </a:r>
+            <a:r>
+              <a:rPr lang="tr-TR" sz="1800" dirty="0">
+                <a:solidFill>
+                  <a:srgbClr val="000000"/>
+                </a:solidFill>
+                <a:latin typeface="Cascadia Mono" panose="020B0609020000020004" pitchFamily="49" charset="0"/>
+              </a:rPr>
+              <a:t> Main()</a:t>
+            </a:r>
+          </a:p>
+          <a:p>
+            <a:pPr marL="158750" indent="0">
+              <a:buNone/>
+            </a:pPr>
+            <a:r>
+              <a:rPr lang="tr-TR" sz="1800" dirty="0">
+                <a:solidFill>
+                  <a:srgbClr val="000000"/>
+                </a:solidFill>
+                <a:latin typeface="Cascadia Mono" panose="020B0609020000020004" pitchFamily="49" charset="0"/>
+              </a:rPr>
+              <a:t>    {</a:t>
+            </a:r>
+          </a:p>
+          <a:p>
+            <a:pPr marL="158750" indent="0">
+              <a:buNone/>
+            </a:pPr>
+            <a:r>
+              <a:rPr lang="tr-TR" sz="1800" dirty="0">
+                <a:solidFill>
+                  <a:srgbClr val="000000"/>
+                </a:solidFill>
+                <a:latin typeface="Cascadia Mono" panose="020B0609020000020004" pitchFamily="49" charset="0"/>
+              </a:rPr>
+              <a:t>        </a:t>
+            </a:r>
+            <a:r>
+              <a:rPr lang="tr-TR" sz="1800" dirty="0" err="1">
+                <a:solidFill>
+                  <a:srgbClr val="0000FF"/>
+                </a:solidFill>
+                <a:latin typeface="Cascadia Mono" panose="020B0609020000020004" pitchFamily="49" charset="0"/>
+              </a:rPr>
+              <a:t>byte</a:t>
+            </a:r>
+            <a:r>
+              <a:rPr lang="tr-TR" sz="1800" dirty="0">
+                <a:solidFill>
+                  <a:srgbClr val="000000"/>
+                </a:solidFill>
+                <a:latin typeface="Cascadia Mono" panose="020B0609020000020004" pitchFamily="49" charset="0"/>
+              </a:rPr>
+              <a:t> a = 16;</a:t>
+            </a:r>
+          </a:p>
+          <a:p>
+            <a:pPr marL="158750" indent="0">
+              <a:buNone/>
+            </a:pPr>
+            <a:r>
+              <a:rPr lang="tr-TR" sz="1800" dirty="0">
+                <a:solidFill>
+                  <a:srgbClr val="000000"/>
+                </a:solidFill>
+                <a:latin typeface="Cascadia Mono" panose="020B0609020000020004" pitchFamily="49" charset="0"/>
+              </a:rPr>
+              <a:t>        </a:t>
+            </a:r>
+            <a:r>
+              <a:rPr lang="tr-TR" sz="1800" dirty="0" err="1">
+                <a:solidFill>
+                  <a:srgbClr val="0000FF"/>
+                </a:solidFill>
+                <a:latin typeface="Cascadia Mono" panose="020B0609020000020004" pitchFamily="49" charset="0"/>
+              </a:rPr>
+              <a:t>byte</a:t>
+            </a:r>
+            <a:r>
+              <a:rPr lang="tr-TR" sz="1800" dirty="0">
+                <a:solidFill>
+                  <a:srgbClr val="000000"/>
+                </a:solidFill>
+                <a:latin typeface="Cascadia Mono" panose="020B0609020000020004" pitchFamily="49" charset="0"/>
+              </a:rPr>
+              <a:t> b = 200;</a:t>
+            </a:r>
+          </a:p>
+          <a:p>
+            <a:pPr marL="158750" indent="0">
+              <a:buNone/>
+            </a:pPr>
+            <a:r>
+              <a:rPr lang="tr-TR" sz="1800" dirty="0">
+                <a:solidFill>
+                  <a:srgbClr val="000000"/>
+                </a:solidFill>
+                <a:latin typeface="Cascadia Mono" panose="020B0609020000020004" pitchFamily="49" charset="0"/>
+              </a:rPr>
+              <a:t>        </a:t>
+            </a:r>
+            <a:r>
+              <a:rPr lang="tr-TR" sz="1800" dirty="0" err="1">
+                <a:solidFill>
+                  <a:srgbClr val="0000FF"/>
+                </a:solidFill>
+                <a:latin typeface="Cascadia Mono" panose="020B0609020000020004" pitchFamily="49" charset="0"/>
+              </a:rPr>
+              <a:t>byte</a:t>
+            </a:r>
+            <a:r>
+              <a:rPr lang="tr-TR" sz="1800" dirty="0">
+                <a:solidFill>
+                  <a:srgbClr val="000000"/>
+                </a:solidFill>
+                <a:latin typeface="Cascadia Mono" panose="020B0609020000020004" pitchFamily="49" charset="0"/>
+              </a:rPr>
+              <a:t> c = a * b;</a:t>
+            </a:r>
+          </a:p>
+          <a:p>
+            <a:pPr marL="158750" indent="0">
+              <a:buNone/>
+            </a:pPr>
+            <a:r>
+              <a:rPr lang="tr-TR" sz="1800" dirty="0">
+                <a:solidFill>
+                  <a:srgbClr val="000000"/>
+                </a:solidFill>
+                <a:latin typeface="Cascadia Mono" panose="020B0609020000020004" pitchFamily="49" charset="0"/>
+              </a:rPr>
+              <a:t>        </a:t>
+            </a:r>
+            <a:r>
+              <a:rPr lang="tr-TR" sz="1800" dirty="0">
+                <a:solidFill>
+                  <a:srgbClr val="008000"/>
+                </a:solidFill>
+                <a:latin typeface="Cascadia Mono" panose="020B0609020000020004" pitchFamily="49" charset="0"/>
+              </a:rPr>
+              <a:t>//</a:t>
+            </a:r>
+            <a:r>
+              <a:rPr lang="tr-TR" sz="1800" dirty="0" err="1">
+                <a:solidFill>
+                  <a:srgbClr val="008000"/>
+                </a:solidFill>
+                <a:latin typeface="Cascadia Mono" panose="020B0609020000020004" pitchFamily="49" charset="0"/>
+              </a:rPr>
+              <a:t>byte</a:t>
+            </a:r>
+            <a:r>
+              <a:rPr lang="tr-TR" sz="1800" dirty="0">
+                <a:solidFill>
+                  <a:srgbClr val="008000"/>
+                </a:solidFill>
+                <a:latin typeface="Cascadia Mono" panose="020B0609020000020004" pitchFamily="49" charset="0"/>
+              </a:rPr>
+              <a:t> yerine </a:t>
+            </a:r>
+            <a:r>
+              <a:rPr lang="tr-TR" sz="1800" dirty="0" err="1">
+                <a:solidFill>
+                  <a:srgbClr val="008000"/>
+                </a:solidFill>
+                <a:latin typeface="Cascadia Mono" panose="020B0609020000020004" pitchFamily="49" charset="0"/>
+              </a:rPr>
+              <a:t>int</a:t>
+            </a:r>
+            <a:r>
+              <a:rPr lang="tr-TR" sz="1800" dirty="0">
+                <a:solidFill>
+                  <a:srgbClr val="008000"/>
+                </a:solidFill>
+                <a:latin typeface="Cascadia Mono" panose="020B0609020000020004" pitchFamily="49" charset="0"/>
+              </a:rPr>
+              <a:t> yazılırsa program sorunsuz derlenir ve çalışır</a:t>
+            </a:r>
+            <a:endParaRPr lang="tr-TR" sz="1800" dirty="0">
+              <a:solidFill>
+                <a:srgbClr val="000000"/>
+              </a:solidFill>
+              <a:latin typeface="Cascadia Mono" panose="020B0609020000020004" pitchFamily="49" charset="0"/>
+            </a:endParaRPr>
+          </a:p>
+          <a:p>
+            <a:pPr marL="158750" indent="0">
+              <a:buNone/>
+            </a:pPr>
+            <a:r>
+              <a:rPr lang="tr-TR" sz="1800" dirty="0">
+                <a:solidFill>
+                  <a:srgbClr val="000000"/>
+                </a:solidFill>
+                <a:latin typeface="Cascadia Mono" panose="020B0609020000020004" pitchFamily="49" charset="0"/>
+              </a:rPr>
+              <a:t>        </a:t>
+            </a:r>
+            <a:r>
+              <a:rPr lang="tr-TR" sz="1800" dirty="0" err="1">
+                <a:solidFill>
+                  <a:srgbClr val="000000"/>
+                </a:solidFill>
+                <a:latin typeface="Cascadia Mono" panose="020B0609020000020004" pitchFamily="49" charset="0"/>
+              </a:rPr>
+              <a:t>Console.WriteLine</a:t>
+            </a:r>
+            <a:r>
+              <a:rPr lang="tr-TR" sz="1800" dirty="0">
+                <a:solidFill>
+                  <a:srgbClr val="000000"/>
+                </a:solidFill>
+                <a:latin typeface="Cascadia Mono" panose="020B0609020000020004" pitchFamily="49" charset="0"/>
+              </a:rPr>
+              <a:t>(c);</a:t>
+            </a:r>
+          </a:p>
+          <a:p>
+            <a:pPr marL="158750" indent="0">
+              <a:buNone/>
+            </a:pPr>
+            <a:r>
+              <a:rPr lang="tr-TR" sz="1800" dirty="0">
+                <a:solidFill>
+                  <a:srgbClr val="000000"/>
+                </a:solidFill>
+                <a:latin typeface="Cascadia Mono" panose="020B0609020000020004" pitchFamily="49" charset="0"/>
+              </a:rPr>
+              <a:t>    }</a:t>
+            </a:r>
+          </a:p>
+          <a:p>
+            <a:pPr marL="158750" indent="0">
+              <a:buNone/>
+            </a:pPr>
+            <a:r>
+              <a:rPr lang="tr-TR" sz="1800" dirty="0">
+                <a:solidFill>
+                  <a:srgbClr val="000000"/>
+                </a:solidFill>
+                <a:latin typeface="Cascadia Mono" panose="020B0609020000020004" pitchFamily="49" charset="0"/>
+              </a:rPr>
+              <a:t>}</a:t>
+            </a:r>
+            <a:endParaRPr lang="tr-TR" dirty="0"/>
+          </a:p>
+        </p:txBody>
+      </p:sp>
+    </p:spTree>
+    <p:extLst>
+      <p:ext uri="{BB962C8B-B14F-4D97-AF65-F5344CB8AC3E}">
+        <p14:creationId xmlns:p14="http://schemas.microsoft.com/office/powerpoint/2010/main" val="667563165"/>
+      </p:ext>
+    </p:extLst>
+  </p:cSld>
+  <p:clrMapOvr>
+    <a:masterClrMapping/>
+  </p:clrMapOvr>
+</p:notes>
+</file>
+
+<file path=ppt/notesSlides/notesSlide13.xml><?xml version="1.0" encoding="utf-8"?>
 <p:notes xmlns:a="http://schemas.openxmlformats.org/drawingml/2006/main" xmlns:r="http://schemas.openxmlformats.org/officeDocument/2006/relationships" xmlns:p="http://schemas.openxmlformats.org/presentationml/2006/main" showMasterSp="0" showMasterPhAnim="0">
   <p:cSld>
     <p:spTree>
@@ -13235,6 +14257,2318 @@
   <p:cSld>
     <p:spTree>
       <p:nvGrpSpPr>
+        <p:cNvPr id="1" name=""/>
+        <p:cNvGrpSpPr/>
+        <p:nvPr/>
+      </p:nvGrpSpPr>
+      <p:grpSpPr>
+        <a:xfrm>
+          <a:off x="0" y="0"/>
+          <a:ext cx="0" cy="0"/>
+          <a:chOff x="0" y="0"/>
+          <a:chExt cx="0" cy="0"/>
+        </a:xfrm>
+      </p:grpSpPr>
+      <p:sp>
+        <p:nvSpPr>
+          <p:cNvPr id="2" name="Başlık 1">
+            <a:extLst>
+              <a:ext uri="{FF2B5EF4-FFF2-40B4-BE49-F238E27FC236}">
+                <a16:creationId xmlns:a16="http://schemas.microsoft.com/office/drawing/2014/main" id="{2B16A630-CBBE-4E08-8E74-D2A5197EA0FA}"/>
+              </a:ext>
+            </a:extLst>
+          </p:cNvPr>
+          <p:cNvSpPr>
+            <a:spLocks noGrp="1"/>
+          </p:cNvSpPr>
+          <p:nvPr>
+            <p:ph type="title"/>
+          </p:nvPr>
+        </p:nvSpPr>
+        <p:spPr/>
+        <p:txBody>
+          <a:bodyPr/>
+          <a:lstStyle/>
+          <a:p>
+            <a:r>
+              <a:rPr lang="tr-TR" dirty="0" err="1"/>
+              <a:t>int</a:t>
+            </a:r>
+            <a:r>
+              <a:rPr lang="tr-TR" dirty="0"/>
+              <a:t> türünün </a:t>
+            </a:r>
+            <a:r>
+              <a:rPr lang="tr-TR" dirty="0" err="1"/>
+              <a:t>byte</a:t>
+            </a:r>
+            <a:r>
+              <a:rPr lang="tr-TR" dirty="0"/>
+              <a:t> türüne dönüşümü</a:t>
+            </a:r>
+          </a:p>
+        </p:txBody>
+      </p:sp>
+      <p:sp>
+        <p:nvSpPr>
+          <p:cNvPr id="3" name="Google Shape;920;p53">
+            <a:extLst>
+              <a:ext uri="{FF2B5EF4-FFF2-40B4-BE49-F238E27FC236}">
+                <a16:creationId xmlns:a16="http://schemas.microsoft.com/office/drawing/2014/main" id="{30E58AE4-4519-4D14-995D-574511CC276A}"/>
+              </a:ext>
+            </a:extLst>
+          </p:cNvPr>
+          <p:cNvSpPr txBox="1"/>
+          <p:nvPr/>
+        </p:nvSpPr>
+        <p:spPr>
+          <a:xfrm>
+            <a:off x="754542" y="1134000"/>
+            <a:ext cx="4981240" cy="3015000"/>
+          </a:xfrm>
+          <a:prstGeom prst="rect">
+            <a:avLst/>
+          </a:prstGeom>
+          <a:noFill/>
+          <a:ln>
+            <a:noFill/>
+          </a:ln>
+        </p:spPr>
+        <p:txBody>
+          <a:bodyPr spcFirstLastPara="1" wrap="square" lIns="91425" tIns="91425" rIns="91425" bIns="91425" anchor="t" anchorCtr="0">
+            <a:noAutofit/>
+          </a:bodyPr>
+          <a:lstStyle/>
+          <a:p>
+            <a:pPr marL="139700" lvl="0" algn="l" rtl="0">
+              <a:lnSpc>
+                <a:spcPct val="115000"/>
+              </a:lnSpc>
+              <a:spcBef>
+                <a:spcPts val="1600"/>
+              </a:spcBef>
+              <a:spcAft>
+                <a:spcPts val="0"/>
+              </a:spcAft>
+              <a:buClr>
+                <a:schemeClr val="lt1"/>
+              </a:buClr>
+              <a:buSzPts val="1400"/>
+            </a:pPr>
+            <a:r>
+              <a:rPr lang="tr-TR" sz="1600" dirty="0">
+                <a:solidFill>
+                  <a:schemeClr val="lt1"/>
+                </a:solidFill>
+                <a:uFill>
+                  <a:noFill/>
+                </a:uFill>
+                <a:latin typeface="Anaheim"/>
+                <a:ea typeface="Anaheim"/>
+                <a:cs typeface="Anaheim"/>
+                <a:sym typeface="Anaheim"/>
+              </a:rPr>
+              <a:t>‘</a:t>
+            </a:r>
+            <a:r>
+              <a:rPr lang="tr-TR" sz="1600" dirty="0" err="1">
+                <a:solidFill>
+                  <a:schemeClr val="lt1"/>
+                </a:solidFill>
+                <a:uFill>
+                  <a:noFill/>
+                </a:uFill>
+                <a:latin typeface="Anaheim"/>
+                <a:ea typeface="Anaheim"/>
+                <a:cs typeface="Anaheim"/>
+                <a:sym typeface="Anaheim"/>
+              </a:rPr>
+              <a:t>cannot</a:t>
+            </a:r>
+            <a:r>
+              <a:rPr lang="tr-TR" sz="1600" dirty="0">
+                <a:solidFill>
+                  <a:schemeClr val="lt1"/>
+                </a:solidFill>
+                <a:uFill>
+                  <a:noFill/>
+                </a:uFill>
+                <a:latin typeface="Anaheim"/>
+                <a:ea typeface="Anaheim"/>
+                <a:cs typeface="Anaheim"/>
+                <a:sym typeface="Anaheim"/>
+              </a:rPr>
+              <a:t> </a:t>
+            </a:r>
+            <a:r>
+              <a:rPr lang="tr-TR" sz="1600" dirty="0" err="1">
+                <a:solidFill>
+                  <a:schemeClr val="lt1"/>
+                </a:solidFill>
+                <a:uFill>
+                  <a:noFill/>
+                </a:uFill>
+                <a:latin typeface="Anaheim"/>
+                <a:ea typeface="Anaheim"/>
+                <a:cs typeface="Anaheim"/>
+                <a:sym typeface="Anaheim"/>
+              </a:rPr>
+              <a:t>implicitly</a:t>
+            </a:r>
+            <a:r>
+              <a:rPr lang="tr-TR" sz="1600" dirty="0">
+                <a:solidFill>
+                  <a:schemeClr val="lt1"/>
+                </a:solidFill>
+                <a:uFill>
+                  <a:noFill/>
+                </a:uFill>
+                <a:latin typeface="Anaheim"/>
+                <a:ea typeface="Anaheim"/>
+                <a:cs typeface="Anaheim"/>
+                <a:sym typeface="Anaheim"/>
+              </a:rPr>
+              <a:t> </a:t>
+            </a:r>
+            <a:r>
+              <a:rPr lang="tr-TR" sz="1600" dirty="0" err="1">
+                <a:solidFill>
+                  <a:schemeClr val="lt1"/>
+                </a:solidFill>
+                <a:uFill>
+                  <a:noFill/>
+                </a:uFill>
+                <a:latin typeface="Anaheim"/>
+                <a:ea typeface="Anaheim"/>
+                <a:cs typeface="Anaheim"/>
+                <a:sym typeface="Anaheim"/>
+              </a:rPr>
+              <a:t>convert</a:t>
+            </a:r>
+            <a:r>
+              <a:rPr lang="tr-TR" sz="1600" dirty="0">
+                <a:solidFill>
+                  <a:schemeClr val="lt1"/>
+                </a:solidFill>
+                <a:uFill>
+                  <a:noFill/>
+                </a:uFill>
+                <a:latin typeface="Anaheim"/>
+                <a:ea typeface="Anaheim"/>
+                <a:cs typeface="Anaheim"/>
+                <a:sym typeface="Anaheim"/>
+              </a:rPr>
+              <a:t> </a:t>
+            </a:r>
+            <a:r>
+              <a:rPr lang="tr-TR" sz="1600" dirty="0" err="1">
+                <a:solidFill>
+                  <a:schemeClr val="lt1"/>
+                </a:solidFill>
+                <a:uFill>
+                  <a:noFill/>
+                </a:uFill>
+                <a:latin typeface="Anaheim"/>
+                <a:ea typeface="Anaheim"/>
+                <a:cs typeface="Anaheim"/>
+                <a:sym typeface="Anaheim"/>
+              </a:rPr>
+              <a:t>type</a:t>
+            </a:r>
+            <a:r>
+              <a:rPr lang="tr-TR" sz="1600" dirty="0">
+                <a:solidFill>
+                  <a:schemeClr val="lt1"/>
+                </a:solidFill>
+                <a:uFill>
+                  <a:noFill/>
+                </a:uFill>
+                <a:latin typeface="Anaheim"/>
+                <a:ea typeface="Anaheim"/>
+                <a:cs typeface="Anaheim"/>
+                <a:sym typeface="Anaheim"/>
+              </a:rPr>
+              <a:t> </a:t>
+            </a:r>
+            <a:r>
+              <a:rPr lang="tr-TR" sz="1600" dirty="0" err="1">
+                <a:solidFill>
+                  <a:schemeClr val="lt1"/>
+                </a:solidFill>
+                <a:uFill>
+                  <a:noFill/>
+                </a:uFill>
+                <a:latin typeface="Anaheim"/>
+                <a:ea typeface="Anaheim"/>
+                <a:cs typeface="Anaheim"/>
+                <a:sym typeface="Anaheim"/>
+              </a:rPr>
+              <a:t>int</a:t>
+            </a:r>
+            <a:r>
+              <a:rPr lang="tr-TR" sz="1600" dirty="0">
+                <a:solidFill>
+                  <a:schemeClr val="lt1"/>
+                </a:solidFill>
+                <a:uFill>
+                  <a:noFill/>
+                </a:uFill>
+                <a:latin typeface="Anaheim"/>
+                <a:ea typeface="Anaheim"/>
+                <a:cs typeface="Anaheim"/>
+                <a:sym typeface="Anaheim"/>
+              </a:rPr>
+              <a:t> </a:t>
+            </a:r>
+            <a:r>
+              <a:rPr lang="tr-TR" sz="1600" dirty="0" err="1">
+                <a:solidFill>
+                  <a:schemeClr val="lt1"/>
+                </a:solidFill>
+                <a:uFill>
+                  <a:noFill/>
+                </a:uFill>
+                <a:latin typeface="Anaheim"/>
+                <a:ea typeface="Anaheim"/>
+                <a:cs typeface="Anaheim"/>
+                <a:sym typeface="Anaheim"/>
+              </a:rPr>
+              <a:t>to</a:t>
+            </a:r>
+            <a:r>
+              <a:rPr lang="tr-TR" sz="1600" dirty="0">
+                <a:solidFill>
+                  <a:schemeClr val="lt1"/>
+                </a:solidFill>
+                <a:uFill>
+                  <a:noFill/>
+                </a:uFill>
+                <a:latin typeface="Anaheim"/>
+                <a:ea typeface="Anaheim"/>
+                <a:cs typeface="Anaheim"/>
+                <a:sym typeface="Anaheim"/>
+              </a:rPr>
+              <a:t> </a:t>
+            </a:r>
+            <a:r>
+              <a:rPr lang="tr-TR" sz="1600" dirty="0" err="1">
+                <a:solidFill>
+                  <a:schemeClr val="lt1"/>
+                </a:solidFill>
+                <a:uFill>
+                  <a:noFill/>
+                </a:uFill>
+                <a:latin typeface="Anaheim"/>
+                <a:ea typeface="Anaheim"/>
+                <a:cs typeface="Anaheim"/>
+                <a:sym typeface="Anaheim"/>
+              </a:rPr>
+              <a:t>byte</a:t>
+            </a:r>
+            <a:r>
+              <a:rPr lang="tr-TR" sz="1600" dirty="0">
+                <a:solidFill>
+                  <a:schemeClr val="lt1"/>
+                </a:solidFill>
+                <a:uFill>
+                  <a:noFill/>
+                </a:uFill>
+                <a:latin typeface="Anaheim"/>
+                <a:ea typeface="Anaheim"/>
+                <a:cs typeface="Anaheim"/>
+                <a:sym typeface="Anaheim"/>
+              </a:rPr>
+              <a:t>’</a:t>
+            </a:r>
+          </a:p>
+          <a:p>
+            <a:pPr marL="139700" lvl="0" algn="l" rtl="0">
+              <a:lnSpc>
+                <a:spcPct val="115000"/>
+              </a:lnSpc>
+              <a:spcBef>
+                <a:spcPts val="1600"/>
+              </a:spcBef>
+              <a:spcAft>
+                <a:spcPts val="0"/>
+              </a:spcAft>
+              <a:buClr>
+                <a:schemeClr val="lt1"/>
+              </a:buClr>
+              <a:buSzPts val="1400"/>
+            </a:pPr>
+            <a:r>
+              <a:rPr lang="tr-TR" sz="1600" dirty="0">
+                <a:solidFill>
+                  <a:schemeClr val="lt1"/>
+                </a:solidFill>
+                <a:uFill>
+                  <a:noFill/>
+                </a:uFill>
+                <a:latin typeface="Anaheim"/>
+                <a:ea typeface="Anaheim"/>
+                <a:cs typeface="Anaheim"/>
+                <a:sym typeface="Anaheim"/>
+              </a:rPr>
+              <a:t>’‘</a:t>
+            </a:r>
+            <a:r>
+              <a:rPr lang="tr-TR" sz="1600" dirty="0" err="1">
+                <a:solidFill>
+                  <a:schemeClr val="lt1"/>
+                </a:solidFill>
+                <a:uFill>
+                  <a:noFill/>
+                </a:uFill>
+                <a:latin typeface="Anaheim"/>
+                <a:ea typeface="Anaheim"/>
+                <a:cs typeface="Anaheim"/>
+                <a:sym typeface="Anaheim"/>
+              </a:rPr>
+              <a:t>int</a:t>
+            </a:r>
+            <a:r>
+              <a:rPr lang="tr-TR" sz="1600" dirty="0">
+                <a:solidFill>
+                  <a:schemeClr val="lt1"/>
+                </a:solidFill>
+                <a:uFill>
+                  <a:noFill/>
+                </a:uFill>
+                <a:latin typeface="Anaheim"/>
+                <a:ea typeface="Anaheim"/>
+                <a:cs typeface="Anaheim"/>
+                <a:sym typeface="Anaheim"/>
+              </a:rPr>
+              <a:t> türü </a:t>
+            </a:r>
+            <a:r>
+              <a:rPr lang="tr-TR" sz="1600" dirty="0" err="1">
+                <a:solidFill>
+                  <a:schemeClr val="lt1"/>
+                </a:solidFill>
+                <a:uFill>
+                  <a:noFill/>
+                </a:uFill>
+                <a:latin typeface="Anaheim"/>
+                <a:ea typeface="Anaheim"/>
+                <a:cs typeface="Anaheim"/>
+                <a:sym typeface="Anaheim"/>
+              </a:rPr>
+              <a:t>byte</a:t>
+            </a:r>
+            <a:r>
+              <a:rPr lang="tr-TR" sz="1600" dirty="0">
+                <a:solidFill>
+                  <a:schemeClr val="lt1"/>
+                </a:solidFill>
+                <a:uFill>
+                  <a:noFill/>
+                </a:uFill>
+                <a:latin typeface="Anaheim"/>
+                <a:ea typeface="Anaheim"/>
+                <a:cs typeface="Anaheim"/>
+                <a:sym typeface="Anaheim"/>
+              </a:rPr>
+              <a:t> türüne bilinçsiz olarak dönüştürülemedi’</a:t>
+            </a:r>
+          </a:p>
+          <a:p>
+            <a:pPr marL="139700" lvl="0" algn="l" rtl="0">
+              <a:lnSpc>
+                <a:spcPct val="115000"/>
+              </a:lnSpc>
+              <a:spcBef>
+                <a:spcPts val="1600"/>
+              </a:spcBef>
+              <a:spcAft>
+                <a:spcPts val="0"/>
+              </a:spcAft>
+              <a:buClr>
+                <a:schemeClr val="lt1"/>
+              </a:buClr>
+              <a:buSzPts val="1400"/>
+            </a:pPr>
+            <a:r>
+              <a:rPr lang="tr-TR" sz="1600" dirty="0" err="1">
+                <a:solidFill>
+                  <a:schemeClr val="lt1"/>
+                </a:solidFill>
+                <a:uFill>
+                  <a:noFill/>
+                </a:uFill>
+                <a:latin typeface="Anaheim"/>
+                <a:ea typeface="Anaheim"/>
+                <a:cs typeface="Anaheim"/>
+                <a:sym typeface="Anaheim"/>
+              </a:rPr>
+              <a:t>Byte</a:t>
+            </a:r>
+            <a:r>
+              <a:rPr lang="tr-TR" sz="1600" dirty="0">
+                <a:solidFill>
+                  <a:schemeClr val="lt1"/>
+                </a:solidFill>
+                <a:uFill>
+                  <a:noFill/>
+                </a:uFill>
+                <a:latin typeface="Anaheim"/>
+                <a:ea typeface="Anaheim"/>
+                <a:cs typeface="Anaheim"/>
+                <a:sym typeface="Anaheim"/>
+              </a:rPr>
+              <a:t> türünden nesneler toplandığında sonuç olarak </a:t>
+            </a:r>
+            <a:r>
+              <a:rPr lang="tr-TR" sz="1600" dirty="0" err="1">
+                <a:solidFill>
+                  <a:schemeClr val="lt1"/>
+                </a:solidFill>
+                <a:uFill>
+                  <a:noFill/>
+                </a:uFill>
+                <a:latin typeface="Anaheim"/>
+                <a:ea typeface="Anaheim"/>
+                <a:cs typeface="Anaheim"/>
+                <a:sym typeface="Anaheim"/>
+              </a:rPr>
+              <a:t>int</a:t>
+            </a:r>
+            <a:r>
+              <a:rPr lang="tr-TR" sz="1600" dirty="0">
+                <a:solidFill>
+                  <a:schemeClr val="lt1"/>
+                </a:solidFill>
+                <a:uFill>
+                  <a:noFill/>
+                </a:uFill>
+                <a:latin typeface="Anaheim"/>
+                <a:ea typeface="Anaheim"/>
+                <a:cs typeface="Anaheim"/>
+                <a:sym typeface="Anaheim"/>
+              </a:rPr>
+              <a:t> türünden nesneler üretilir.</a:t>
+            </a:r>
+          </a:p>
+          <a:p>
+            <a:pPr marL="139700" lvl="0" algn="l" rtl="0">
+              <a:lnSpc>
+                <a:spcPct val="115000"/>
+              </a:lnSpc>
+              <a:spcBef>
+                <a:spcPts val="1600"/>
+              </a:spcBef>
+              <a:spcAft>
+                <a:spcPts val="0"/>
+              </a:spcAft>
+              <a:buClr>
+                <a:schemeClr val="lt1"/>
+              </a:buClr>
+              <a:buSzPts val="1400"/>
+            </a:pPr>
+            <a:r>
+              <a:rPr lang="tr-TR" sz="1600" dirty="0">
+                <a:solidFill>
+                  <a:schemeClr val="lt1"/>
+                </a:solidFill>
+                <a:uFill>
+                  <a:noFill/>
+                </a:uFill>
+                <a:latin typeface="Anaheim"/>
+                <a:ea typeface="Anaheim"/>
+                <a:cs typeface="Anaheim"/>
+                <a:sym typeface="Anaheim"/>
+              </a:rPr>
+              <a:t>İki ya da daha fazla </a:t>
+            </a:r>
+            <a:r>
+              <a:rPr lang="tr-TR" sz="1600" dirty="0" err="1">
+                <a:solidFill>
+                  <a:schemeClr val="lt1"/>
+                </a:solidFill>
+                <a:uFill>
+                  <a:noFill/>
+                </a:uFill>
+                <a:latin typeface="Anaheim"/>
+                <a:ea typeface="Anaheim"/>
+                <a:cs typeface="Anaheim"/>
+                <a:sym typeface="Anaheim"/>
+              </a:rPr>
+              <a:t>byte</a:t>
+            </a:r>
+            <a:r>
+              <a:rPr lang="tr-TR" sz="1600" dirty="0">
+                <a:solidFill>
+                  <a:schemeClr val="lt1"/>
+                </a:solidFill>
+                <a:uFill>
+                  <a:noFill/>
+                </a:uFill>
+                <a:latin typeface="Anaheim"/>
+                <a:ea typeface="Anaheim"/>
+                <a:cs typeface="Anaheim"/>
+                <a:sym typeface="Anaheim"/>
+              </a:rPr>
+              <a:t> türünden nesne ile aritmetik işlem yapılacaksa sonuç mutlaka </a:t>
+            </a:r>
+            <a:r>
+              <a:rPr lang="tr-TR" sz="1600" dirty="0" err="1">
+                <a:solidFill>
+                  <a:schemeClr val="lt1"/>
+                </a:solidFill>
+                <a:uFill>
+                  <a:noFill/>
+                </a:uFill>
+                <a:latin typeface="Anaheim"/>
+                <a:ea typeface="Anaheim"/>
+                <a:cs typeface="Anaheim"/>
+                <a:sym typeface="Anaheim"/>
+              </a:rPr>
+              <a:t>int</a:t>
+            </a:r>
+            <a:r>
+              <a:rPr lang="tr-TR" sz="1600" dirty="0">
+                <a:solidFill>
+                  <a:schemeClr val="lt1"/>
+                </a:solidFill>
+                <a:uFill>
+                  <a:noFill/>
+                </a:uFill>
+                <a:latin typeface="Anaheim"/>
+                <a:ea typeface="Anaheim"/>
+                <a:cs typeface="Anaheim"/>
+                <a:sym typeface="Anaheim"/>
+              </a:rPr>
+              <a:t> ya da daha büyük bir türe atanmalıdır.</a:t>
+            </a:r>
+          </a:p>
+        </p:txBody>
+      </p:sp>
+      <p:pic>
+        <p:nvPicPr>
+          <p:cNvPr id="5" name="Resim 4">
+            <a:extLst>
+              <a:ext uri="{FF2B5EF4-FFF2-40B4-BE49-F238E27FC236}">
+                <a16:creationId xmlns:a16="http://schemas.microsoft.com/office/drawing/2014/main" id="{D858E3F2-84A7-4B8E-9119-7B009C836781}"/>
+              </a:ext>
+            </a:extLst>
+          </p:cNvPr>
+          <p:cNvPicPr>
+            <a:picLocks noChangeAspect="1"/>
+          </p:cNvPicPr>
+          <p:nvPr/>
+        </p:nvPicPr>
+        <p:blipFill>
+          <a:blip r:embed="rId3"/>
+          <a:stretch>
+            <a:fillRect/>
+          </a:stretch>
+        </p:blipFill>
+        <p:spPr>
+          <a:xfrm>
+            <a:off x="5735782" y="1470450"/>
+            <a:ext cx="3295650" cy="2800350"/>
+          </a:xfrm>
+          <a:prstGeom prst="rect">
+            <a:avLst/>
+          </a:prstGeom>
+        </p:spPr>
+      </p:pic>
+    </p:spTree>
+    <p:extLst>
+      <p:ext uri="{BB962C8B-B14F-4D97-AF65-F5344CB8AC3E}">
+        <p14:creationId xmlns:p14="http://schemas.microsoft.com/office/powerpoint/2010/main" val="3519981053"/>
+      </p:ext>
+    </p:extLst>
+  </p:cSld>
+  <p:clrMapOvr>
+    <a:masterClrMapping/>
+  </p:clrMapOvr>
+</p:sld>
+</file>
+
+<file path=ppt/slides/slide12.xml><?xml version="1.0" encoding="utf-8"?>
+<p:sld xmlns:a="http://schemas.openxmlformats.org/drawingml/2006/main" xmlns:r="http://schemas.openxmlformats.org/officeDocument/2006/relationships" xmlns:p="http://schemas.openxmlformats.org/presentationml/2006/main">
+  <p:cSld>
+    <p:spTree>
+      <p:nvGrpSpPr>
+        <p:cNvPr id="1" name=""/>
+        <p:cNvGrpSpPr/>
+        <p:nvPr/>
+      </p:nvGrpSpPr>
+      <p:grpSpPr>
+        <a:xfrm>
+          <a:off x="0" y="0"/>
+          <a:ext cx="0" cy="0"/>
+          <a:chOff x="0" y="0"/>
+          <a:chExt cx="0" cy="0"/>
+        </a:xfrm>
+      </p:grpSpPr>
+      <p:sp>
+        <p:nvSpPr>
+          <p:cNvPr id="2" name="Başlık 1">
+            <a:extLst>
+              <a:ext uri="{FF2B5EF4-FFF2-40B4-BE49-F238E27FC236}">
+                <a16:creationId xmlns:a16="http://schemas.microsoft.com/office/drawing/2014/main" id="{2B16A630-CBBE-4E08-8E74-D2A5197EA0FA}"/>
+              </a:ext>
+            </a:extLst>
+          </p:cNvPr>
+          <p:cNvSpPr>
+            <a:spLocks noGrp="1"/>
+          </p:cNvSpPr>
+          <p:nvPr>
+            <p:ph type="title"/>
+          </p:nvPr>
+        </p:nvSpPr>
+        <p:spPr/>
+        <p:txBody>
+          <a:bodyPr/>
+          <a:lstStyle/>
+          <a:p>
+            <a:r>
+              <a:rPr lang="tr-TR" dirty="0" err="1"/>
+              <a:t>byte</a:t>
+            </a:r>
+            <a:r>
+              <a:rPr lang="tr-TR" dirty="0"/>
+              <a:t> türü sınır aşımı</a:t>
+            </a:r>
+          </a:p>
+        </p:txBody>
+      </p:sp>
+      <p:sp>
+        <p:nvSpPr>
+          <p:cNvPr id="3" name="Google Shape;920;p53">
+            <a:extLst>
+              <a:ext uri="{FF2B5EF4-FFF2-40B4-BE49-F238E27FC236}">
+                <a16:creationId xmlns:a16="http://schemas.microsoft.com/office/drawing/2014/main" id="{30E58AE4-4519-4D14-995D-574511CC276A}"/>
+              </a:ext>
+            </a:extLst>
+          </p:cNvPr>
+          <p:cNvSpPr txBox="1"/>
+          <p:nvPr/>
+        </p:nvSpPr>
+        <p:spPr>
+          <a:xfrm>
+            <a:off x="754542" y="1134000"/>
+            <a:ext cx="4981240" cy="3015000"/>
+          </a:xfrm>
+          <a:prstGeom prst="rect">
+            <a:avLst/>
+          </a:prstGeom>
+          <a:noFill/>
+          <a:ln>
+            <a:noFill/>
+          </a:ln>
+        </p:spPr>
+        <p:txBody>
+          <a:bodyPr spcFirstLastPara="1" wrap="square" lIns="91425" tIns="91425" rIns="91425" bIns="91425" anchor="t" anchorCtr="0">
+            <a:noAutofit/>
+          </a:bodyPr>
+          <a:lstStyle/>
+          <a:p>
+            <a:pPr marL="139700" lvl="0" algn="l" rtl="0">
+              <a:lnSpc>
+                <a:spcPct val="115000"/>
+              </a:lnSpc>
+              <a:spcBef>
+                <a:spcPts val="1600"/>
+              </a:spcBef>
+              <a:spcAft>
+                <a:spcPts val="0"/>
+              </a:spcAft>
+              <a:buClr>
+                <a:schemeClr val="lt1"/>
+              </a:buClr>
+              <a:buSzPts val="1400"/>
+            </a:pPr>
+            <a:r>
+              <a:rPr lang="tr-TR" sz="1600" dirty="0" err="1">
+                <a:solidFill>
+                  <a:schemeClr val="lt1"/>
+                </a:solidFill>
+                <a:uFill>
+                  <a:noFill/>
+                </a:uFill>
+                <a:latin typeface="Anaheim"/>
+                <a:ea typeface="Anaheim"/>
+                <a:cs typeface="Anaheim"/>
+                <a:sym typeface="Anaheim"/>
+              </a:rPr>
+              <a:t>byte</a:t>
+            </a:r>
+            <a:r>
+              <a:rPr lang="tr-TR" sz="1600" dirty="0">
+                <a:solidFill>
+                  <a:schemeClr val="lt1"/>
+                </a:solidFill>
+                <a:uFill>
+                  <a:noFill/>
+                </a:uFill>
+                <a:latin typeface="Anaheim"/>
+                <a:ea typeface="Anaheim"/>
+                <a:cs typeface="Anaheim"/>
+                <a:sym typeface="Anaheim"/>
+              </a:rPr>
+              <a:t> türünden saklanabilecek en büyük değer 255’tir.</a:t>
+            </a:r>
+          </a:p>
+          <a:p>
+            <a:pPr marL="139700" lvl="0" algn="l" rtl="0">
+              <a:lnSpc>
+                <a:spcPct val="115000"/>
+              </a:lnSpc>
+              <a:spcBef>
+                <a:spcPts val="1600"/>
+              </a:spcBef>
+              <a:spcAft>
+                <a:spcPts val="0"/>
+              </a:spcAft>
+              <a:buClr>
+                <a:schemeClr val="lt1"/>
+              </a:buClr>
+              <a:buSzPts val="1400"/>
+            </a:pPr>
+            <a:r>
+              <a:rPr lang="tr-TR" sz="1600" dirty="0" err="1">
+                <a:solidFill>
+                  <a:schemeClr val="lt1"/>
+                </a:solidFill>
+                <a:uFill>
+                  <a:noFill/>
+                </a:uFill>
+                <a:latin typeface="Anaheim"/>
+                <a:ea typeface="Anaheim"/>
+                <a:cs typeface="Anaheim"/>
+                <a:sym typeface="Anaheim"/>
+              </a:rPr>
+              <a:t>byte</a:t>
+            </a:r>
+            <a:r>
+              <a:rPr lang="tr-TR" sz="1600" dirty="0">
+                <a:solidFill>
+                  <a:schemeClr val="lt1"/>
+                </a:solidFill>
+                <a:uFill>
+                  <a:noFill/>
+                </a:uFill>
+                <a:latin typeface="Anaheim"/>
+                <a:ea typeface="Anaheim"/>
+                <a:cs typeface="Anaheim"/>
+                <a:sym typeface="Anaheim"/>
+              </a:rPr>
+              <a:t> türünde sayılarla yapılan işlemler </a:t>
+            </a:r>
+            <a:r>
+              <a:rPr lang="tr-TR" sz="1600" dirty="0" err="1">
+                <a:solidFill>
+                  <a:schemeClr val="lt1"/>
+                </a:solidFill>
+                <a:uFill>
+                  <a:noFill/>
+                </a:uFill>
+                <a:latin typeface="Anaheim"/>
+                <a:ea typeface="Anaheim"/>
+                <a:cs typeface="Anaheim"/>
+                <a:sym typeface="Anaheim"/>
+              </a:rPr>
+              <a:t>byte</a:t>
+            </a:r>
+            <a:r>
+              <a:rPr lang="tr-TR" sz="1600" dirty="0">
+                <a:solidFill>
+                  <a:schemeClr val="lt1"/>
+                </a:solidFill>
+                <a:uFill>
+                  <a:noFill/>
+                </a:uFill>
+                <a:latin typeface="Anaheim"/>
+                <a:ea typeface="Anaheim"/>
+                <a:cs typeface="Anaheim"/>
+                <a:sym typeface="Anaheim"/>
+              </a:rPr>
+              <a:t> türü sınırını aşabilir.</a:t>
+            </a:r>
+          </a:p>
+          <a:p>
+            <a:pPr marL="139700" lvl="0" algn="l" rtl="0">
+              <a:lnSpc>
+                <a:spcPct val="115000"/>
+              </a:lnSpc>
+              <a:spcBef>
+                <a:spcPts val="1600"/>
+              </a:spcBef>
+              <a:spcAft>
+                <a:spcPts val="0"/>
+              </a:spcAft>
+              <a:buClr>
+                <a:schemeClr val="lt1"/>
+              </a:buClr>
+              <a:buSzPts val="1400"/>
+            </a:pPr>
+            <a:r>
+              <a:rPr lang="tr-TR" sz="1600" dirty="0" err="1">
+                <a:solidFill>
+                  <a:schemeClr val="lt1"/>
+                </a:solidFill>
+                <a:uFill>
+                  <a:noFill/>
+                </a:uFill>
+                <a:latin typeface="Anaheim"/>
+                <a:ea typeface="Anaheim"/>
+                <a:cs typeface="Anaheim"/>
+                <a:sym typeface="Anaheim"/>
+              </a:rPr>
+              <a:t>byte</a:t>
+            </a:r>
+            <a:r>
+              <a:rPr lang="tr-TR" sz="1600" dirty="0">
+                <a:solidFill>
+                  <a:schemeClr val="lt1"/>
+                </a:solidFill>
+                <a:uFill>
+                  <a:noFill/>
+                </a:uFill>
+                <a:latin typeface="Anaheim"/>
+                <a:ea typeface="Anaheim"/>
+                <a:cs typeface="Anaheim"/>
+                <a:sym typeface="Anaheim"/>
+              </a:rPr>
+              <a:t> türü ile yapılan işlemler bu nedenle </a:t>
+            </a:r>
+            <a:r>
+              <a:rPr lang="tr-TR" sz="1600" dirty="0" err="1">
+                <a:solidFill>
+                  <a:schemeClr val="lt1"/>
+                </a:solidFill>
+                <a:uFill>
+                  <a:noFill/>
+                </a:uFill>
+                <a:latin typeface="Anaheim"/>
+                <a:ea typeface="Anaheim"/>
+                <a:cs typeface="Anaheim"/>
+                <a:sym typeface="Anaheim"/>
+              </a:rPr>
+              <a:t>int</a:t>
+            </a:r>
+            <a:r>
+              <a:rPr lang="tr-TR" sz="1600" dirty="0">
+                <a:solidFill>
+                  <a:schemeClr val="lt1"/>
+                </a:solidFill>
+                <a:uFill>
+                  <a:noFill/>
+                </a:uFill>
+                <a:latin typeface="Anaheim"/>
+                <a:ea typeface="Anaheim"/>
+                <a:cs typeface="Anaheim"/>
+                <a:sym typeface="Anaheim"/>
+              </a:rPr>
+              <a:t> türüne dönüştürülmektedir.</a:t>
+            </a:r>
+          </a:p>
+          <a:p>
+            <a:pPr marL="139700" lvl="0" algn="l" rtl="0">
+              <a:lnSpc>
+                <a:spcPct val="115000"/>
+              </a:lnSpc>
+              <a:spcBef>
+                <a:spcPts val="1600"/>
+              </a:spcBef>
+              <a:spcAft>
+                <a:spcPts val="0"/>
+              </a:spcAft>
+              <a:buClr>
+                <a:schemeClr val="lt1"/>
+              </a:buClr>
+              <a:buSzPts val="1400"/>
+            </a:pPr>
+            <a:r>
+              <a:rPr lang="tr-TR" sz="1600" dirty="0">
+                <a:solidFill>
+                  <a:schemeClr val="lt1"/>
+                </a:solidFill>
+                <a:uFill>
+                  <a:noFill/>
+                </a:uFill>
+                <a:latin typeface="Anaheim"/>
+                <a:ea typeface="Anaheim"/>
+                <a:cs typeface="Anaheim"/>
+                <a:sym typeface="Anaheim"/>
+              </a:rPr>
+              <a:t>Aksi halde program derlenememektedir.</a:t>
+            </a:r>
+          </a:p>
+        </p:txBody>
+      </p:sp>
+      <p:pic>
+        <p:nvPicPr>
+          <p:cNvPr id="6" name="Resim 5">
+            <a:extLst>
+              <a:ext uri="{FF2B5EF4-FFF2-40B4-BE49-F238E27FC236}">
+                <a16:creationId xmlns:a16="http://schemas.microsoft.com/office/drawing/2014/main" id="{7E298A54-9801-4655-AD9E-780AB5D5E263}"/>
+              </a:ext>
+            </a:extLst>
+          </p:cNvPr>
+          <p:cNvPicPr>
+            <a:picLocks noChangeAspect="1"/>
+          </p:cNvPicPr>
+          <p:nvPr/>
+        </p:nvPicPr>
+        <p:blipFill>
+          <a:blip r:embed="rId3"/>
+          <a:stretch>
+            <a:fillRect/>
+          </a:stretch>
+        </p:blipFill>
+        <p:spPr>
+          <a:xfrm>
+            <a:off x="5596318" y="1409175"/>
+            <a:ext cx="3419475" cy="2600325"/>
+          </a:xfrm>
+          <a:prstGeom prst="rect">
+            <a:avLst/>
+          </a:prstGeom>
+        </p:spPr>
+      </p:pic>
+    </p:spTree>
+    <p:extLst>
+      <p:ext uri="{BB962C8B-B14F-4D97-AF65-F5344CB8AC3E}">
+        <p14:creationId xmlns:p14="http://schemas.microsoft.com/office/powerpoint/2010/main" val="2334050534"/>
+      </p:ext>
+    </p:extLst>
+  </p:cSld>
+  <p:clrMapOvr>
+    <a:masterClrMapping/>
+  </p:clrMapOvr>
+</p:sld>
+</file>
+
+<file path=ppt/slides/slide13.xml><?xml version="1.0" encoding="utf-8"?>
+<p:sld xmlns:a="http://schemas.openxmlformats.org/drawingml/2006/main" xmlns:r="http://schemas.openxmlformats.org/officeDocument/2006/relationships" xmlns:p="http://schemas.openxmlformats.org/presentationml/2006/main">
+  <p:cSld>
+    <p:spTree>
+      <p:nvGrpSpPr>
+        <p:cNvPr id="1" name=""/>
+        <p:cNvGrpSpPr/>
+        <p:nvPr/>
+      </p:nvGrpSpPr>
+      <p:grpSpPr>
+        <a:xfrm>
+          <a:off x="0" y="0"/>
+          <a:ext cx="0" cy="0"/>
+          <a:chOff x="0" y="0"/>
+          <a:chExt cx="0" cy="0"/>
+        </a:xfrm>
+      </p:grpSpPr>
+      <p:sp>
+        <p:nvSpPr>
+          <p:cNvPr id="2" name="Başlık 1">
+            <a:extLst>
+              <a:ext uri="{FF2B5EF4-FFF2-40B4-BE49-F238E27FC236}">
+                <a16:creationId xmlns:a16="http://schemas.microsoft.com/office/drawing/2014/main" id="{CB064556-D76E-4642-A35E-394F64B1ECAA}"/>
+              </a:ext>
+            </a:extLst>
+          </p:cNvPr>
+          <p:cNvSpPr>
+            <a:spLocks noGrp="1"/>
+          </p:cNvSpPr>
+          <p:nvPr>
+            <p:ph type="title"/>
+          </p:nvPr>
+        </p:nvSpPr>
+        <p:spPr/>
+        <p:txBody>
+          <a:bodyPr/>
+          <a:lstStyle/>
+          <a:p>
+            <a:r>
+              <a:rPr lang="tr-TR" dirty="0"/>
+              <a:t>Sabitler üzerinde bilinçsiz tür dönüşümleri</a:t>
+            </a:r>
+          </a:p>
+        </p:txBody>
+      </p:sp>
+      <p:sp>
+        <p:nvSpPr>
+          <p:cNvPr id="3" name="Google Shape;920;p53">
+            <a:extLst>
+              <a:ext uri="{FF2B5EF4-FFF2-40B4-BE49-F238E27FC236}">
+                <a16:creationId xmlns:a16="http://schemas.microsoft.com/office/drawing/2014/main" id="{9F4859E9-2F6A-491D-A343-DE22D506A63B}"/>
+              </a:ext>
+            </a:extLst>
+          </p:cNvPr>
+          <p:cNvSpPr txBox="1"/>
+          <p:nvPr/>
+        </p:nvSpPr>
+        <p:spPr>
+          <a:xfrm>
+            <a:off x="754542" y="1134000"/>
+            <a:ext cx="7584786" cy="3015000"/>
+          </a:xfrm>
+          <a:prstGeom prst="rect">
+            <a:avLst/>
+          </a:prstGeom>
+          <a:noFill/>
+          <a:ln>
+            <a:noFill/>
+          </a:ln>
+        </p:spPr>
+        <p:txBody>
+          <a:bodyPr spcFirstLastPara="1" wrap="square" lIns="91425" tIns="91425" rIns="91425" bIns="91425" anchor="t" anchorCtr="0">
+            <a:noAutofit/>
+          </a:bodyPr>
+          <a:lstStyle/>
+          <a:p>
+            <a:pPr marL="139700" lvl="0" algn="l" rtl="0">
+              <a:lnSpc>
+                <a:spcPct val="115000"/>
+              </a:lnSpc>
+              <a:spcBef>
+                <a:spcPts val="1600"/>
+              </a:spcBef>
+              <a:spcAft>
+                <a:spcPts val="0"/>
+              </a:spcAft>
+              <a:buClr>
+                <a:schemeClr val="lt1"/>
+              </a:buClr>
+              <a:buSzPts val="1400"/>
+            </a:pPr>
+            <a:r>
+              <a:rPr lang="tr-TR" sz="1600" dirty="0">
+                <a:solidFill>
+                  <a:schemeClr val="lt1"/>
+                </a:solidFill>
+                <a:uFill>
+                  <a:noFill/>
+                </a:uFill>
+                <a:latin typeface="Anaheim"/>
+                <a:ea typeface="Anaheim"/>
+                <a:cs typeface="Anaheim"/>
+                <a:sym typeface="Anaheim"/>
+              </a:rPr>
+              <a:t>Bir </a:t>
+            </a:r>
+            <a:r>
+              <a:rPr lang="tr-TR" sz="1600" dirty="0" err="1">
+                <a:solidFill>
+                  <a:schemeClr val="lt1"/>
+                </a:solidFill>
+                <a:uFill>
+                  <a:noFill/>
+                </a:uFill>
+                <a:latin typeface="Anaheim"/>
+                <a:ea typeface="Anaheim"/>
+                <a:cs typeface="Anaheim"/>
+                <a:sym typeface="Anaheim"/>
+              </a:rPr>
+              <a:t>float</a:t>
+            </a:r>
+            <a:r>
+              <a:rPr lang="tr-TR" sz="1600" dirty="0">
+                <a:solidFill>
+                  <a:schemeClr val="lt1"/>
+                </a:solidFill>
+                <a:uFill>
+                  <a:noFill/>
+                </a:uFill>
+                <a:latin typeface="Anaheim"/>
+                <a:ea typeface="Anaheim"/>
+                <a:cs typeface="Anaheim"/>
+                <a:sym typeface="Anaheim"/>
+              </a:rPr>
+              <a:t> sabiti olan 16.5 sayısı </a:t>
+            </a:r>
+            <a:r>
+              <a:rPr lang="tr-TR" sz="1600" dirty="0" err="1">
+                <a:solidFill>
+                  <a:schemeClr val="lt1"/>
+                </a:solidFill>
+                <a:uFill>
+                  <a:noFill/>
+                </a:uFill>
+                <a:latin typeface="Anaheim"/>
+                <a:ea typeface="Anaheim"/>
+                <a:cs typeface="Anaheim"/>
+                <a:sym typeface="Anaheim"/>
+              </a:rPr>
+              <a:t>double</a:t>
+            </a:r>
+            <a:r>
+              <a:rPr lang="tr-TR" sz="1600" dirty="0">
+                <a:solidFill>
+                  <a:schemeClr val="lt1"/>
+                </a:solidFill>
+                <a:uFill>
+                  <a:noFill/>
+                </a:uFill>
+                <a:latin typeface="Anaheim"/>
+                <a:ea typeface="Anaheim"/>
+                <a:cs typeface="Anaheim"/>
+                <a:sym typeface="Anaheim"/>
+              </a:rPr>
+              <a:t> türünden bir değişkene atanabilir.</a:t>
+            </a:r>
+          </a:p>
+          <a:p>
+            <a:pPr marL="139700" lvl="0" algn="l" rtl="0">
+              <a:lnSpc>
+                <a:spcPct val="115000"/>
+              </a:lnSpc>
+              <a:spcBef>
+                <a:spcPts val="1600"/>
+              </a:spcBef>
+              <a:spcAft>
+                <a:spcPts val="0"/>
+              </a:spcAft>
+              <a:buClr>
+                <a:schemeClr val="lt1"/>
+              </a:buClr>
+              <a:buSzPts val="1400"/>
+            </a:pPr>
+            <a:r>
+              <a:rPr lang="tr-TR" sz="1600" dirty="0" err="1">
+                <a:solidFill>
+                  <a:schemeClr val="lt1"/>
+                </a:solidFill>
+                <a:uFill>
+                  <a:noFill/>
+                </a:uFill>
+                <a:latin typeface="Anaheim"/>
+                <a:ea typeface="Anaheim"/>
+                <a:cs typeface="Anaheim"/>
+                <a:sym typeface="Anaheim"/>
+              </a:rPr>
+              <a:t>double</a:t>
+            </a:r>
+            <a:r>
+              <a:rPr lang="tr-TR" sz="1600" dirty="0">
+                <a:solidFill>
+                  <a:schemeClr val="lt1"/>
+                </a:solidFill>
+                <a:uFill>
+                  <a:noFill/>
+                </a:uFill>
+                <a:latin typeface="Anaheim"/>
+                <a:ea typeface="Anaheim"/>
+                <a:cs typeface="Anaheim"/>
+                <a:sym typeface="Anaheim"/>
+              </a:rPr>
+              <a:t> c = 16.5f;</a:t>
+            </a:r>
+          </a:p>
+          <a:p>
+            <a:pPr marL="139700" lvl="0" algn="l" rtl="0">
+              <a:lnSpc>
+                <a:spcPct val="115000"/>
+              </a:lnSpc>
+              <a:spcBef>
+                <a:spcPts val="1600"/>
+              </a:spcBef>
+              <a:spcAft>
+                <a:spcPts val="0"/>
+              </a:spcAft>
+              <a:buClr>
+                <a:schemeClr val="lt1"/>
+              </a:buClr>
+              <a:buSzPts val="1400"/>
+            </a:pPr>
+            <a:endParaRPr lang="tr-TR" sz="1600" dirty="0">
+              <a:solidFill>
+                <a:schemeClr val="lt1"/>
+              </a:solidFill>
+              <a:uFill>
+                <a:noFill/>
+              </a:uFill>
+              <a:latin typeface="Anaheim"/>
+              <a:ea typeface="Anaheim"/>
+              <a:cs typeface="Anaheim"/>
+              <a:sym typeface="Anaheim"/>
+            </a:endParaRPr>
+          </a:p>
+          <a:p>
+            <a:pPr marL="139700" lvl="0" algn="l" rtl="0">
+              <a:lnSpc>
+                <a:spcPct val="115000"/>
+              </a:lnSpc>
+              <a:spcBef>
+                <a:spcPts val="1600"/>
+              </a:spcBef>
+              <a:spcAft>
+                <a:spcPts val="0"/>
+              </a:spcAft>
+              <a:buClr>
+                <a:schemeClr val="lt1"/>
+              </a:buClr>
+              <a:buSzPts val="1400"/>
+            </a:pPr>
+            <a:r>
+              <a:rPr lang="tr-TR" sz="1600" dirty="0" err="1">
+                <a:solidFill>
+                  <a:schemeClr val="lt1"/>
+                </a:solidFill>
+                <a:uFill>
+                  <a:noFill/>
+                </a:uFill>
+                <a:latin typeface="Anaheim"/>
+                <a:ea typeface="Anaheim"/>
+                <a:cs typeface="Anaheim"/>
+                <a:sym typeface="Anaheim"/>
+              </a:rPr>
+              <a:t>char</a:t>
+            </a:r>
+            <a:r>
+              <a:rPr lang="tr-TR" sz="1600" dirty="0">
+                <a:solidFill>
+                  <a:schemeClr val="lt1"/>
+                </a:solidFill>
+                <a:uFill>
+                  <a:noFill/>
+                </a:uFill>
+                <a:latin typeface="Anaheim"/>
+                <a:ea typeface="Anaheim"/>
+                <a:cs typeface="Anaheim"/>
+                <a:sym typeface="Anaheim"/>
+              </a:rPr>
+              <a:t> türünden ‘a’ karakteri </a:t>
+            </a:r>
+            <a:r>
+              <a:rPr lang="tr-TR" sz="1600" dirty="0" err="1">
+                <a:solidFill>
+                  <a:schemeClr val="lt1"/>
+                </a:solidFill>
+                <a:uFill>
+                  <a:noFill/>
+                </a:uFill>
+                <a:latin typeface="Anaheim"/>
+                <a:ea typeface="Anaheim"/>
+                <a:cs typeface="Anaheim"/>
+                <a:sym typeface="Anaheim"/>
+              </a:rPr>
+              <a:t>int</a:t>
+            </a:r>
+            <a:r>
+              <a:rPr lang="tr-TR" sz="1600" dirty="0">
+                <a:solidFill>
+                  <a:schemeClr val="lt1"/>
+                </a:solidFill>
+                <a:uFill>
+                  <a:noFill/>
+                </a:uFill>
+                <a:latin typeface="Anaheim"/>
+                <a:ea typeface="Anaheim"/>
+                <a:cs typeface="Anaheim"/>
+                <a:sym typeface="Anaheim"/>
+              </a:rPr>
+              <a:t> türünden bir değişkene atanabilir.</a:t>
+            </a:r>
+          </a:p>
+          <a:p>
+            <a:pPr marL="139700" lvl="0" algn="l" rtl="0">
+              <a:lnSpc>
+                <a:spcPct val="115000"/>
+              </a:lnSpc>
+              <a:spcBef>
+                <a:spcPts val="1600"/>
+              </a:spcBef>
+              <a:spcAft>
+                <a:spcPts val="0"/>
+              </a:spcAft>
+              <a:buClr>
+                <a:schemeClr val="lt1"/>
+              </a:buClr>
+              <a:buSzPts val="1400"/>
+            </a:pPr>
+            <a:r>
+              <a:rPr lang="tr-TR" sz="1600" dirty="0" err="1">
+                <a:solidFill>
+                  <a:schemeClr val="lt1"/>
+                </a:solidFill>
+                <a:uFill>
+                  <a:noFill/>
+                </a:uFill>
+                <a:latin typeface="Anaheim"/>
+                <a:ea typeface="Anaheim"/>
+                <a:cs typeface="Anaheim"/>
+                <a:sym typeface="Anaheim"/>
+              </a:rPr>
+              <a:t>int</a:t>
+            </a:r>
+            <a:r>
+              <a:rPr lang="tr-TR" sz="1600" dirty="0">
+                <a:solidFill>
+                  <a:schemeClr val="lt1"/>
+                </a:solidFill>
+                <a:uFill>
+                  <a:noFill/>
+                </a:uFill>
+                <a:latin typeface="Anaheim"/>
+                <a:ea typeface="Anaheim"/>
+                <a:cs typeface="Anaheim"/>
+                <a:sym typeface="Anaheim"/>
+              </a:rPr>
+              <a:t> c = ‘a’;</a:t>
+            </a:r>
+          </a:p>
+        </p:txBody>
+      </p:sp>
+    </p:spTree>
+    <p:extLst>
+      <p:ext uri="{BB962C8B-B14F-4D97-AF65-F5344CB8AC3E}">
+        <p14:creationId xmlns:p14="http://schemas.microsoft.com/office/powerpoint/2010/main" val="3465839823"/>
+      </p:ext>
+    </p:extLst>
+  </p:cSld>
+  <p:clrMapOvr>
+    <a:masterClrMapping/>
+  </p:clrMapOvr>
+</p:sld>
+</file>
+
+<file path=ppt/slides/slide14.xml><?xml version="1.0" encoding="utf-8"?>
+<p:sld xmlns:a="http://schemas.openxmlformats.org/drawingml/2006/main" xmlns:r="http://schemas.openxmlformats.org/officeDocument/2006/relationships" xmlns:p="http://schemas.openxmlformats.org/presentationml/2006/main">
+  <p:cSld>
+    <p:spTree>
+      <p:nvGrpSpPr>
+        <p:cNvPr id="1" name=""/>
+        <p:cNvGrpSpPr/>
+        <p:nvPr/>
+      </p:nvGrpSpPr>
+      <p:grpSpPr>
+        <a:xfrm>
+          <a:off x="0" y="0"/>
+          <a:ext cx="0" cy="0"/>
+          <a:chOff x="0" y="0"/>
+          <a:chExt cx="0" cy="0"/>
+        </a:xfrm>
+      </p:grpSpPr>
+      <p:sp>
+        <p:nvSpPr>
+          <p:cNvPr id="2" name="Başlık 1">
+            <a:extLst>
+              <a:ext uri="{FF2B5EF4-FFF2-40B4-BE49-F238E27FC236}">
+                <a16:creationId xmlns:a16="http://schemas.microsoft.com/office/drawing/2014/main" id="{CB064556-D76E-4642-A35E-394F64B1ECAA}"/>
+              </a:ext>
+            </a:extLst>
+          </p:cNvPr>
+          <p:cNvSpPr>
+            <a:spLocks noGrp="1"/>
+          </p:cNvSpPr>
+          <p:nvPr>
+            <p:ph type="title"/>
+          </p:nvPr>
+        </p:nvSpPr>
+        <p:spPr/>
+        <p:txBody>
+          <a:bodyPr/>
+          <a:lstStyle/>
+          <a:p>
+            <a:r>
+              <a:rPr lang="tr-TR" sz="2800" dirty="0"/>
+              <a:t>Bilinçsiz olarak tür dönüşümü yapılabilecek veri türleri</a:t>
+            </a:r>
+          </a:p>
+        </p:txBody>
+      </p:sp>
+      <p:sp>
+        <p:nvSpPr>
+          <p:cNvPr id="3" name="Google Shape;920;p53">
+            <a:extLst>
+              <a:ext uri="{FF2B5EF4-FFF2-40B4-BE49-F238E27FC236}">
+                <a16:creationId xmlns:a16="http://schemas.microsoft.com/office/drawing/2014/main" id="{9F4859E9-2F6A-491D-A343-DE22D506A63B}"/>
+              </a:ext>
+            </a:extLst>
+          </p:cNvPr>
+          <p:cNvSpPr txBox="1"/>
+          <p:nvPr/>
+        </p:nvSpPr>
+        <p:spPr>
+          <a:xfrm>
+            <a:off x="754542" y="1134000"/>
+            <a:ext cx="7584786" cy="3015000"/>
+          </a:xfrm>
+          <a:prstGeom prst="rect">
+            <a:avLst/>
+          </a:prstGeom>
+          <a:noFill/>
+          <a:ln>
+            <a:noFill/>
+          </a:ln>
+        </p:spPr>
+        <p:txBody>
+          <a:bodyPr spcFirstLastPara="1" wrap="square" lIns="91425" tIns="91425" rIns="91425" bIns="91425" anchor="t" anchorCtr="0">
+            <a:noAutofit/>
+          </a:bodyPr>
+          <a:lstStyle/>
+          <a:p>
+            <a:pPr marL="139700" lvl="0" algn="l" rtl="0">
+              <a:lnSpc>
+                <a:spcPct val="115000"/>
+              </a:lnSpc>
+              <a:spcBef>
+                <a:spcPts val="1600"/>
+              </a:spcBef>
+              <a:spcAft>
+                <a:spcPts val="0"/>
+              </a:spcAft>
+              <a:buClr>
+                <a:schemeClr val="lt1"/>
+              </a:buClr>
+              <a:buSzPts val="1400"/>
+            </a:pPr>
+            <a:endParaRPr lang="tr-TR" sz="1600" dirty="0">
+              <a:solidFill>
+                <a:schemeClr val="lt1"/>
+              </a:solidFill>
+              <a:uFill>
+                <a:noFill/>
+              </a:uFill>
+              <a:latin typeface="Anaheim"/>
+              <a:ea typeface="Anaheim"/>
+              <a:cs typeface="Anaheim"/>
+              <a:sym typeface="Anaheim"/>
+            </a:endParaRPr>
+          </a:p>
+        </p:txBody>
+      </p:sp>
+      <p:graphicFrame>
+        <p:nvGraphicFramePr>
+          <p:cNvPr id="4" name="Tablo 4">
+            <a:extLst>
+              <a:ext uri="{FF2B5EF4-FFF2-40B4-BE49-F238E27FC236}">
+                <a16:creationId xmlns:a16="http://schemas.microsoft.com/office/drawing/2014/main" id="{14517423-7798-4F09-B45C-412B1EBE09C9}"/>
+              </a:ext>
+            </a:extLst>
+          </p:cNvPr>
+          <p:cNvGraphicFramePr>
+            <a:graphicFrameLocks noGrp="1"/>
+          </p:cNvGraphicFramePr>
+          <p:nvPr>
+            <p:extLst>
+              <p:ext uri="{D42A27DB-BD31-4B8C-83A1-F6EECF244321}">
+                <p14:modId xmlns:p14="http://schemas.microsoft.com/office/powerpoint/2010/main" val="537836777"/>
+              </p:ext>
+            </p:extLst>
+          </p:nvPr>
+        </p:nvGraphicFramePr>
+        <p:xfrm>
+          <a:off x="779607" y="1280414"/>
+          <a:ext cx="7584786" cy="3749610"/>
+        </p:xfrm>
+        <a:graphic>
+          <a:graphicData uri="http://schemas.openxmlformats.org/drawingml/2006/table">
+            <a:tbl>
+              <a:tblPr firstRow="1" bandRow="1">
+                <a:tableStyleId>{67D90328-B219-4D07-A67F-F8CB142C126C}</a:tableStyleId>
+              </a:tblPr>
+              <a:tblGrid>
+                <a:gridCol w="1531458">
+                  <a:extLst>
+                    <a:ext uri="{9D8B030D-6E8A-4147-A177-3AD203B41FA5}">
+                      <a16:colId xmlns:a16="http://schemas.microsoft.com/office/drawing/2014/main" val="1136013785"/>
+                    </a:ext>
+                  </a:extLst>
+                </a:gridCol>
+                <a:gridCol w="6053328">
+                  <a:extLst>
+                    <a:ext uri="{9D8B030D-6E8A-4147-A177-3AD203B41FA5}">
+                      <a16:colId xmlns:a16="http://schemas.microsoft.com/office/drawing/2014/main" val="983910349"/>
+                    </a:ext>
+                  </a:extLst>
+                </a:gridCol>
+              </a:tblGrid>
+              <a:tr h="512549">
+                <a:tc>
+                  <a:txBody>
+                    <a:bodyPr/>
+                    <a:lstStyle/>
+                    <a:p>
+                      <a:pPr algn="ctr"/>
+                      <a:r>
+                        <a:rPr lang="tr-TR" dirty="0"/>
+                        <a:t>Dönüşümün yapılacağı tür</a:t>
+                      </a:r>
+                    </a:p>
+                  </a:txBody>
+                  <a:tcPr>
+                    <a:solidFill>
+                      <a:schemeClr val="bg1"/>
+                    </a:solidFill>
+                  </a:tcPr>
+                </a:tc>
+                <a:tc>
+                  <a:txBody>
+                    <a:bodyPr/>
+                    <a:lstStyle/>
+                    <a:p>
+                      <a:pPr algn="ctr"/>
+                      <a:r>
+                        <a:rPr lang="tr-TR" dirty="0"/>
+                        <a:t>Dönüşüm sonunda oluşacak tür</a:t>
+                      </a:r>
+                    </a:p>
+                  </a:txBody>
+                  <a:tcPr>
+                    <a:solidFill>
+                      <a:schemeClr val="bg1"/>
+                    </a:solidFill>
+                  </a:tcPr>
+                </a:tc>
+                <a:extLst>
+                  <a:ext uri="{0D108BD9-81ED-4DB2-BD59-A6C34878D82A}">
+                    <a16:rowId xmlns:a16="http://schemas.microsoft.com/office/drawing/2014/main" val="317639849"/>
+                  </a:ext>
+                </a:extLst>
+              </a:tr>
+              <a:tr h="359050">
+                <a:tc>
+                  <a:txBody>
+                    <a:bodyPr/>
+                    <a:lstStyle/>
+                    <a:p>
+                      <a:r>
+                        <a:rPr lang="tr-TR" dirty="0" err="1"/>
+                        <a:t>sbyte</a:t>
+                      </a:r>
+                      <a:endParaRPr lang="tr-TR" dirty="0"/>
+                    </a:p>
+                  </a:txBody>
+                  <a:tcPr>
+                    <a:solidFill>
+                      <a:schemeClr val="bg1"/>
+                    </a:solidFill>
+                  </a:tcPr>
+                </a:tc>
+                <a:tc>
+                  <a:txBody>
+                    <a:bodyPr/>
+                    <a:lstStyle/>
+                    <a:p>
+                      <a:r>
+                        <a:rPr lang="tr-TR" dirty="0" err="1"/>
+                        <a:t>short</a:t>
+                      </a:r>
+                      <a:r>
+                        <a:rPr lang="tr-TR" dirty="0"/>
+                        <a:t>, </a:t>
+                      </a:r>
+                      <a:r>
+                        <a:rPr lang="tr-TR" dirty="0" err="1"/>
+                        <a:t>int</a:t>
+                      </a:r>
+                      <a:r>
+                        <a:rPr lang="tr-TR" dirty="0"/>
+                        <a:t>, </a:t>
+                      </a:r>
+                      <a:r>
+                        <a:rPr lang="tr-TR" dirty="0" err="1"/>
+                        <a:t>float</a:t>
+                      </a:r>
+                      <a:r>
+                        <a:rPr lang="tr-TR" dirty="0"/>
+                        <a:t>, </a:t>
+                      </a:r>
+                      <a:r>
+                        <a:rPr lang="tr-TR" dirty="0" err="1"/>
+                        <a:t>long</a:t>
+                      </a:r>
+                      <a:r>
+                        <a:rPr lang="tr-TR" dirty="0"/>
+                        <a:t>, </a:t>
+                      </a:r>
+                      <a:r>
+                        <a:rPr lang="tr-TR" dirty="0" err="1"/>
+                        <a:t>double</a:t>
+                      </a:r>
+                      <a:r>
+                        <a:rPr lang="tr-TR" dirty="0"/>
+                        <a:t>, </a:t>
+                      </a:r>
+                      <a:r>
+                        <a:rPr lang="tr-TR" dirty="0" err="1"/>
+                        <a:t>decimal</a:t>
+                      </a:r>
+                      <a:endParaRPr lang="tr-TR" dirty="0"/>
+                    </a:p>
+                  </a:txBody>
+                  <a:tcPr>
+                    <a:solidFill>
+                      <a:schemeClr val="bg1"/>
+                    </a:solidFill>
+                  </a:tcPr>
+                </a:tc>
+                <a:extLst>
+                  <a:ext uri="{0D108BD9-81ED-4DB2-BD59-A6C34878D82A}">
+                    <a16:rowId xmlns:a16="http://schemas.microsoft.com/office/drawing/2014/main" val="879599377"/>
+                  </a:ext>
+                </a:extLst>
+              </a:tr>
+              <a:tr h="359050">
+                <a:tc>
+                  <a:txBody>
+                    <a:bodyPr/>
+                    <a:lstStyle/>
+                    <a:p>
+                      <a:r>
+                        <a:rPr lang="tr-TR" dirty="0" err="1"/>
+                        <a:t>byte</a:t>
+                      </a:r>
+                      <a:endParaRPr lang="tr-TR" dirty="0"/>
+                    </a:p>
+                  </a:txBody>
+                  <a:tcPr>
+                    <a:solidFill>
+                      <a:schemeClr val="bg1"/>
+                    </a:solidFill>
+                  </a:tcPr>
+                </a:tc>
+                <a:tc>
+                  <a:txBody>
+                    <a:bodyPr/>
+                    <a:lstStyle/>
+                    <a:p>
+                      <a:r>
+                        <a:rPr lang="tr-TR" dirty="0" err="1"/>
+                        <a:t>short</a:t>
+                      </a:r>
+                      <a:r>
+                        <a:rPr lang="tr-TR" dirty="0"/>
+                        <a:t>, </a:t>
+                      </a:r>
+                      <a:r>
+                        <a:rPr lang="tr-TR" dirty="0" err="1"/>
+                        <a:t>ushort</a:t>
+                      </a:r>
+                      <a:r>
+                        <a:rPr lang="tr-TR" dirty="0"/>
+                        <a:t>, </a:t>
+                      </a:r>
+                      <a:r>
+                        <a:rPr lang="tr-TR" dirty="0" err="1"/>
+                        <a:t>int</a:t>
+                      </a:r>
+                      <a:r>
+                        <a:rPr lang="tr-TR" dirty="0"/>
+                        <a:t>, </a:t>
+                      </a:r>
+                      <a:r>
+                        <a:rPr lang="tr-TR" dirty="0" err="1"/>
+                        <a:t>uint</a:t>
+                      </a:r>
+                      <a:r>
+                        <a:rPr lang="tr-TR" dirty="0"/>
+                        <a:t>, </a:t>
+                      </a:r>
+                      <a:r>
+                        <a:rPr lang="tr-TR" dirty="0" err="1"/>
+                        <a:t>long</a:t>
+                      </a:r>
+                      <a:r>
+                        <a:rPr lang="tr-TR" dirty="0"/>
+                        <a:t>, </a:t>
+                      </a:r>
+                      <a:r>
+                        <a:rPr lang="tr-TR" dirty="0" err="1"/>
+                        <a:t>ulong</a:t>
+                      </a:r>
+                      <a:r>
+                        <a:rPr lang="tr-TR" dirty="0"/>
+                        <a:t>, </a:t>
+                      </a:r>
+                      <a:r>
+                        <a:rPr lang="tr-TR" dirty="0" err="1"/>
+                        <a:t>float</a:t>
+                      </a:r>
+                      <a:r>
+                        <a:rPr lang="tr-TR" dirty="0"/>
+                        <a:t>, </a:t>
+                      </a:r>
+                      <a:r>
+                        <a:rPr lang="tr-TR" dirty="0" err="1"/>
+                        <a:t>double</a:t>
+                      </a:r>
+                      <a:r>
+                        <a:rPr lang="tr-TR" dirty="0"/>
+                        <a:t>, </a:t>
+                      </a:r>
+                      <a:r>
+                        <a:rPr lang="tr-TR" dirty="0" err="1"/>
+                        <a:t>decimal</a:t>
+                      </a:r>
+                      <a:endParaRPr lang="tr-TR" dirty="0"/>
+                    </a:p>
+                  </a:txBody>
+                  <a:tcPr>
+                    <a:solidFill>
+                      <a:schemeClr val="bg1"/>
+                    </a:solidFill>
+                  </a:tcPr>
+                </a:tc>
+                <a:extLst>
+                  <a:ext uri="{0D108BD9-81ED-4DB2-BD59-A6C34878D82A}">
+                    <a16:rowId xmlns:a16="http://schemas.microsoft.com/office/drawing/2014/main" val="458070100"/>
+                  </a:ext>
+                </a:extLst>
+              </a:tr>
+              <a:tr h="359050">
+                <a:tc>
+                  <a:txBody>
+                    <a:bodyPr/>
+                    <a:lstStyle/>
+                    <a:p>
+                      <a:r>
+                        <a:rPr lang="tr-TR" dirty="0" err="1"/>
+                        <a:t>short</a:t>
+                      </a:r>
+                      <a:endParaRPr lang="tr-TR" dirty="0"/>
+                    </a:p>
+                  </a:txBody>
+                  <a:tcPr>
+                    <a:solidFill>
+                      <a:schemeClr val="bg1"/>
+                    </a:solidFill>
+                  </a:tcPr>
+                </a:tc>
+                <a:tc>
+                  <a:txBody>
+                    <a:bodyPr/>
+                    <a:lstStyle/>
+                    <a:p>
+                      <a:r>
+                        <a:rPr lang="tr-TR" dirty="0" err="1"/>
+                        <a:t>int</a:t>
+                      </a:r>
+                      <a:r>
+                        <a:rPr lang="tr-TR" dirty="0"/>
+                        <a:t>, </a:t>
+                      </a:r>
+                      <a:r>
+                        <a:rPr lang="tr-TR" dirty="0" err="1"/>
+                        <a:t>long</a:t>
+                      </a:r>
+                      <a:r>
+                        <a:rPr lang="tr-TR" dirty="0"/>
+                        <a:t>, </a:t>
+                      </a:r>
+                      <a:r>
+                        <a:rPr lang="tr-TR" dirty="0" err="1"/>
+                        <a:t>float</a:t>
+                      </a:r>
+                      <a:r>
+                        <a:rPr lang="tr-TR" dirty="0"/>
+                        <a:t>, </a:t>
+                      </a:r>
+                      <a:r>
+                        <a:rPr lang="tr-TR" dirty="0" err="1"/>
+                        <a:t>double</a:t>
+                      </a:r>
+                      <a:r>
+                        <a:rPr lang="tr-TR" dirty="0"/>
+                        <a:t>, </a:t>
+                      </a:r>
+                      <a:r>
+                        <a:rPr lang="tr-TR" dirty="0" err="1"/>
+                        <a:t>decimal</a:t>
+                      </a:r>
+                      <a:endParaRPr lang="tr-TR" dirty="0"/>
+                    </a:p>
+                  </a:txBody>
+                  <a:tcPr>
+                    <a:solidFill>
+                      <a:schemeClr val="bg1"/>
+                    </a:solidFill>
+                  </a:tcPr>
+                </a:tc>
+                <a:extLst>
+                  <a:ext uri="{0D108BD9-81ED-4DB2-BD59-A6C34878D82A}">
+                    <a16:rowId xmlns:a16="http://schemas.microsoft.com/office/drawing/2014/main" val="402054446"/>
+                  </a:ext>
+                </a:extLst>
+              </a:tr>
+              <a:tr h="359050">
+                <a:tc>
+                  <a:txBody>
+                    <a:bodyPr/>
+                    <a:lstStyle/>
+                    <a:p>
+                      <a:r>
+                        <a:rPr lang="tr-TR" dirty="0" err="1"/>
+                        <a:t>ushort</a:t>
+                      </a:r>
+                      <a:endParaRPr lang="tr-TR" dirty="0"/>
+                    </a:p>
+                  </a:txBody>
+                  <a:tcPr>
+                    <a:solidFill>
+                      <a:schemeClr val="bg1"/>
+                    </a:solidFill>
+                  </a:tcPr>
+                </a:tc>
+                <a:tc>
+                  <a:txBody>
+                    <a:bodyPr/>
+                    <a:lstStyle/>
+                    <a:p>
+                      <a:pPr marL="0" marR="0" lvl="0" indent="0" algn="l" defTabSz="914400" rtl="0" eaLnBrk="1" fontAlgn="auto" latinLnBrk="0" hangingPunct="1">
+                        <a:lnSpc>
+                          <a:spcPct val="100000"/>
+                        </a:lnSpc>
+                        <a:spcBef>
+                          <a:spcPts val="0"/>
+                        </a:spcBef>
+                        <a:spcAft>
+                          <a:spcPts val="0"/>
+                        </a:spcAft>
+                        <a:buClr>
+                          <a:srgbClr val="000000"/>
+                        </a:buClr>
+                        <a:buSzTx/>
+                        <a:buFont typeface="Arial"/>
+                        <a:buNone/>
+                        <a:tabLst/>
+                        <a:defRPr/>
+                      </a:pPr>
+                      <a:r>
+                        <a:rPr lang="tr-TR" dirty="0" err="1"/>
+                        <a:t>int</a:t>
+                      </a:r>
+                      <a:r>
+                        <a:rPr lang="tr-TR" dirty="0"/>
+                        <a:t>, </a:t>
+                      </a:r>
+                      <a:r>
+                        <a:rPr lang="tr-TR" dirty="0" err="1"/>
+                        <a:t>uint</a:t>
+                      </a:r>
+                      <a:r>
+                        <a:rPr lang="tr-TR" dirty="0"/>
+                        <a:t>, </a:t>
+                      </a:r>
+                      <a:r>
+                        <a:rPr lang="tr-TR" dirty="0" err="1"/>
+                        <a:t>long</a:t>
+                      </a:r>
+                      <a:r>
+                        <a:rPr lang="tr-TR" dirty="0"/>
+                        <a:t>, </a:t>
+                      </a:r>
+                      <a:r>
+                        <a:rPr lang="tr-TR" dirty="0" err="1"/>
+                        <a:t>ulong</a:t>
+                      </a:r>
+                      <a:r>
+                        <a:rPr lang="tr-TR" dirty="0"/>
+                        <a:t>, </a:t>
+                      </a:r>
+                      <a:r>
+                        <a:rPr lang="tr-TR" dirty="0" err="1"/>
+                        <a:t>float</a:t>
+                      </a:r>
+                      <a:r>
+                        <a:rPr lang="tr-TR" dirty="0"/>
+                        <a:t>, </a:t>
+                      </a:r>
+                      <a:r>
+                        <a:rPr lang="tr-TR" dirty="0" err="1"/>
+                        <a:t>double</a:t>
+                      </a:r>
+                      <a:r>
+                        <a:rPr lang="tr-TR" dirty="0"/>
+                        <a:t>, </a:t>
+                      </a:r>
+                      <a:r>
+                        <a:rPr lang="tr-TR" dirty="0" err="1"/>
+                        <a:t>decimal</a:t>
+                      </a:r>
+                      <a:endParaRPr lang="tr-TR" dirty="0"/>
+                    </a:p>
+                  </a:txBody>
+                  <a:tcPr>
+                    <a:solidFill>
+                      <a:schemeClr val="bg1"/>
+                    </a:solidFill>
+                  </a:tcPr>
+                </a:tc>
+                <a:extLst>
+                  <a:ext uri="{0D108BD9-81ED-4DB2-BD59-A6C34878D82A}">
+                    <a16:rowId xmlns:a16="http://schemas.microsoft.com/office/drawing/2014/main" val="1108538894"/>
+                  </a:ext>
+                </a:extLst>
+              </a:tr>
+              <a:tr h="359050">
+                <a:tc>
+                  <a:txBody>
+                    <a:bodyPr/>
+                    <a:lstStyle/>
+                    <a:p>
+                      <a:r>
+                        <a:rPr lang="tr-TR" dirty="0" err="1"/>
+                        <a:t>int</a:t>
+                      </a:r>
+                      <a:endParaRPr lang="tr-TR" dirty="0"/>
+                    </a:p>
+                  </a:txBody>
+                  <a:tcPr>
+                    <a:solidFill>
+                      <a:schemeClr val="bg1"/>
+                    </a:solidFill>
+                  </a:tcPr>
+                </a:tc>
+                <a:tc>
+                  <a:txBody>
+                    <a:bodyPr/>
+                    <a:lstStyle/>
+                    <a:p>
+                      <a:r>
+                        <a:rPr lang="tr-TR" dirty="0" err="1"/>
+                        <a:t>long</a:t>
+                      </a:r>
+                      <a:r>
+                        <a:rPr lang="tr-TR" dirty="0"/>
+                        <a:t>, </a:t>
+                      </a:r>
+                      <a:r>
+                        <a:rPr lang="tr-TR" dirty="0" err="1"/>
+                        <a:t>float</a:t>
+                      </a:r>
+                      <a:r>
+                        <a:rPr lang="tr-TR" dirty="0"/>
+                        <a:t>, </a:t>
+                      </a:r>
+                      <a:r>
+                        <a:rPr lang="tr-TR" dirty="0" err="1"/>
+                        <a:t>double</a:t>
+                      </a:r>
+                      <a:r>
+                        <a:rPr lang="tr-TR" dirty="0"/>
+                        <a:t>, </a:t>
+                      </a:r>
+                      <a:r>
+                        <a:rPr lang="tr-TR" dirty="0" err="1"/>
+                        <a:t>decimal</a:t>
+                      </a:r>
+                      <a:endParaRPr lang="tr-TR" dirty="0"/>
+                    </a:p>
+                  </a:txBody>
+                  <a:tcPr>
+                    <a:solidFill>
+                      <a:schemeClr val="bg1"/>
+                    </a:solidFill>
+                  </a:tcPr>
+                </a:tc>
+                <a:extLst>
+                  <a:ext uri="{0D108BD9-81ED-4DB2-BD59-A6C34878D82A}">
+                    <a16:rowId xmlns:a16="http://schemas.microsoft.com/office/drawing/2014/main" val="450033446"/>
+                  </a:ext>
+                </a:extLst>
+              </a:tr>
+              <a:tr h="359050">
+                <a:tc>
+                  <a:txBody>
+                    <a:bodyPr/>
+                    <a:lstStyle/>
+                    <a:p>
+                      <a:r>
+                        <a:rPr lang="tr-TR" dirty="0" err="1"/>
+                        <a:t>uint</a:t>
+                      </a:r>
+                      <a:endParaRPr lang="tr-TR" dirty="0"/>
+                    </a:p>
+                  </a:txBody>
+                  <a:tcPr>
+                    <a:solidFill>
+                      <a:schemeClr val="bg1"/>
+                    </a:solidFill>
+                  </a:tcPr>
+                </a:tc>
+                <a:tc>
+                  <a:txBody>
+                    <a:bodyPr/>
+                    <a:lstStyle/>
+                    <a:p>
+                      <a:r>
+                        <a:rPr lang="tr-TR" dirty="0" err="1"/>
+                        <a:t>long</a:t>
+                      </a:r>
+                      <a:r>
+                        <a:rPr lang="tr-TR" dirty="0"/>
+                        <a:t>, </a:t>
+                      </a:r>
+                      <a:r>
+                        <a:rPr lang="tr-TR" dirty="0" err="1"/>
+                        <a:t>ulong</a:t>
+                      </a:r>
+                      <a:r>
+                        <a:rPr lang="tr-TR" dirty="0"/>
+                        <a:t>, </a:t>
+                      </a:r>
+                      <a:r>
+                        <a:rPr lang="tr-TR" dirty="0" err="1"/>
+                        <a:t>float</a:t>
+                      </a:r>
+                      <a:r>
+                        <a:rPr lang="tr-TR" dirty="0"/>
+                        <a:t>, </a:t>
+                      </a:r>
+                      <a:r>
+                        <a:rPr lang="tr-TR" dirty="0" err="1"/>
+                        <a:t>double</a:t>
+                      </a:r>
+                      <a:r>
+                        <a:rPr lang="tr-TR" dirty="0"/>
+                        <a:t>, </a:t>
+                      </a:r>
+                      <a:r>
+                        <a:rPr lang="tr-TR" dirty="0" err="1"/>
+                        <a:t>decimal</a:t>
+                      </a:r>
+                      <a:endParaRPr lang="tr-TR" dirty="0"/>
+                    </a:p>
+                  </a:txBody>
+                  <a:tcPr>
+                    <a:solidFill>
+                      <a:schemeClr val="bg1"/>
+                    </a:solidFill>
+                  </a:tcPr>
+                </a:tc>
+                <a:extLst>
+                  <a:ext uri="{0D108BD9-81ED-4DB2-BD59-A6C34878D82A}">
+                    <a16:rowId xmlns:a16="http://schemas.microsoft.com/office/drawing/2014/main" val="2895416154"/>
+                  </a:ext>
+                </a:extLst>
+              </a:tr>
+              <a:tr h="359050">
+                <a:tc>
+                  <a:txBody>
+                    <a:bodyPr/>
+                    <a:lstStyle/>
+                    <a:p>
+                      <a:r>
+                        <a:rPr lang="tr-TR" dirty="0" err="1"/>
+                        <a:t>long</a:t>
+                      </a:r>
+                      <a:r>
+                        <a:rPr lang="tr-TR" dirty="0"/>
+                        <a:t>, </a:t>
+                      </a:r>
+                      <a:r>
+                        <a:rPr lang="tr-TR" dirty="0" err="1"/>
+                        <a:t>ulong</a:t>
+                      </a:r>
+                      <a:endParaRPr lang="tr-TR" dirty="0"/>
+                    </a:p>
+                  </a:txBody>
+                  <a:tcPr>
+                    <a:solidFill>
+                      <a:schemeClr val="bg1"/>
+                    </a:solidFill>
+                  </a:tcPr>
+                </a:tc>
+                <a:tc>
+                  <a:txBody>
+                    <a:bodyPr/>
+                    <a:lstStyle/>
+                    <a:p>
+                      <a:r>
+                        <a:rPr lang="tr-TR" dirty="0" err="1"/>
+                        <a:t>float</a:t>
+                      </a:r>
+                      <a:r>
+                        <a:rPr lang="tr-TR" dirty="0"/>
+                        <a:t>, </a:t>
+                      </a:r>
+                      <a:r>
+                        <a:rPr lang="tr-TR" dirty="0" err="1"/>
+                        <a:t>double</a:t>
+                      </a:r>
+                      <a:r>
+                        <a:rPr lang="tr-TR" dirty="0"/>
+                        <a:t>, </a:t>
+                      </a:r>
+                      <a:r>
+                        <a:rPr lang="tr-TR" dirty="0" err="1"/>
+                        <a:t>decimal</a:t>
+                      </a:r>
+                      <a:endParaRPr lang="tr-TR" dirty="0"/>
+                    </a:p>
+                  </a:txBody>
+                  <a:tcPr>
+                    <a:solidFill>
+                      <a:schemeClr val="bg1"/>
+                    </a:solidFill>
+                  </a:tcPr>
+                </a:tc>
+                <a:extLst>
+                  <a:ext uri="{0D108BD9-81ED-4DB2-BD59-A6C34878D82A}">
+                    <a16:rowId xmlns:a16="http://schemas.microsoft.com/office/drawing/2014/main" val="388306498"/>
+                  </a:ext>
+                </a:extLst>
+              </a:tr>
+              <a:tr h="359050">
+                <a:tc>
+                  <a:txBody>
+                    <a:bodyPr/>
+                    <a:lstStyle/>
+                    <a:p>
+                      <a:r>
+                        <a:rPr lang="tr-TR" dirty="0" err="1"/>
+                        <a:t>char</a:t>
+                      </a:r>
+                      <a:endParaRPr lang="tr-TR" dirty="0"/>
+                    </a:p>
+                  </a:txBody>
+                  <a:tcPr>
+                    <a:solidFill>
+                      <a:schemeClr val="bg1"/>
+                    </a:solidFill>
+                  </a:tcPr>
+                </a:tc>
+                <a:tc>
+                  <a:txBody>
+                    <a:bodyPr/>
+                    <a:lstStyle/>
+                    <a:p>
+                      <a:r>
+                        <a:rPr lang="tr-TR" dirty="0" err="1"/>
+                        <a:t>ushort</a:t>
+                      </a:r>
+                      <a:r>
+                        <a:rPr lang="tr-TR" dirty="0"/>
+                        <a:t>, </a:t>
+                      </a:r>
+                      <a:r>
+                        <a:rPr lang="tr-TR" dirty="0" err="1"/>
+                        <a:t>int</a:t>
+                      </a:r>
+                      <a:r>
+                        <a:rPr lang="tr-TR" dirty="0"/>
+                        <a:t>, </a:t>
+                      </a:r>
+                      <a:r>
+                        <a:rPr lang="tr-TR" dirty="0" err="1"/>
+                        <a:t>uint</a:t>
+                      </a:r>
+                      <a:r>
+                        <a:rPr lang="tr-TR" dirty="0"/>
+                        <a:t>, </a:t>
+                      </a:r>
+                      <a:r>
+                        <a:rPr lang="tr-TR" dirty="0" err="1"/>
+                        <a:t>long</a:t>
+                      </a:r>
+                      <a:r>
+                        <a:rPr lang="tr-TR" dirty="0"/>
+                        <a:t>, </a:t>
+                      </a:r>
+                      <a:r>
+                        <a:rPr lang="tr-TR" dirty="0" err="1"/>
+                        <a:t>ulong</a:t>
+                      </a:r>
+                      <a:r>
+                        <a:rPr lang="tr-TR" dirty="0"/>
+                        <a:t>, </a:t>
+                      </a:r>
+                      <a:r>
+                        <a:rPr lang="tr-TR" dirty="0" err="1"/>
+                        <a:t>float</a:t>
+                      </a:r>
+                      <a:r>
+                        <a:rPr lang="tr-TR" dirty="0"/>
+                        <a:t>, </a:t>
+                      </a:r>
+                      <a:r>
+                        <a:rPr lang="tr-TR" dirty="0" err="1"/>
+                        <a:t>double</a:t>
+                      </a:r>
+                      <a:r>
+                        <a:rPr lang="tr-TR" dirty="0"/>
+                        <a:t>, </a:t>
+                      </a:r>
+                      <a:r>
+                        <a:rPr lang="tr-TR" dirty="0" err="1"/>
+                        <a:t>decimal</a:t>
+                      </a:r>
+                      <a:endParaRPr lang="tr-TR" dirty="0"/>
+                    </a:p>
+                  </a:txBody>
+                  <a:tcPr>
+                    <a:solidFill>
+                      <a:schemeClr val="bg1"/>
+                    </a:solidFill>
+                  </a:tcPr>
+                </a:tc>
+                <a:extLst>
+                  <a:ext uri="{0D108BD9-81ED-4DB2-BD59-A6C34878D82A}">
+                    <a16:rowId xmlns:a16="http://schemas.microsoft.com/office/drawing/2014/main" val="2719842146"/>
+                  </a:ext>
+                </a:extLst>
+              </a:tr>
+              <a:tr h="359050">
+                <a:tc>
+                  <a:txBody>
+                    <a:bodyPr/>
+                    <a:lstStyle/>
+                    <a:p>
+                      <a:r>
+                        <a:rPr lang="tr-TR" dirty="0" err="1"/>
+                        <a:t>float</a:t>
+                      </a:r>
+                      <a:endParaRPr lang="tr-TR" dirty="0"/>
+                    </a:p>
+                  </a:txBody>
+                  <a:tcPr>
+                    <a:solidFill>
+                      <a:schemeClr val="bg1"/>
+                    </a:solidFill>
+                  </a:tcPr>
+                </a:tc>
+                <a:tc>
+                  <a:txBody>
+                    <a:bodyPr/>
+                    <a:lstStyle/>
+                    <a:p>
+                      <a:r>
+                        <a:rPr lang="tr-TR" dirty="0" err="1"/>
+                        <a:t>double</a:t>
+                      </a:r>
+                      <a:endParaRPr lang="tr-TR" dirty="0"/>
+                    </a:p>
+                  </a:txBody>
+                  <a:tcPr>
+                    <a:solidFill>
+                      <a:schemeClr val="bg1"/>
+                    </a:solidFill>
+                  </a:tcPr>
+                </a:tc>
+                <a:extLst>
+                  <a:ext uri="{0D108BD9-81ED-4DB2-BD59-A6C34878D82A}">
+                    <a16:rowId xmlns:a16="http://schemas.microsoft.com/office/drawing/2014/main" val="1183448027"/>
+                  </a:ext>
+                </a:extLst>
+              </a:tr>
+            </a:tbl>
+          </a:graphicData>
+        </a:graphic>
+      </p:graphicFrame>
+    </p:spTree>
+    <p:extLst>
+      <p:ext uri="{BB962C8B-B14F-4D97-AF65-F5344CB8AC3E}">
+        <p14:creationId xmlns:p14="http://schemas.microsoft.com/office/powerpoint/2010/main" val="588009596"/>
+      </p:ext>
+    </p:extLst>
+  </p:cSld>
+  <p:clrMapOvr>
+    <a:masterClrMapping/>
+  </p:clrMapOvr>
+</p:sld>
+</file>
+
+<file path=ppt/slides/slide15.xml><?xml version="1.0" encoding="utf-8"?>
+<p:sld xmlns:a="http://schemas.openxmlformats.org/drawingml/2006/main" xmlns:r="http://schemas.openxmlformats.org/officeDocument/2006/relationships" xmlns:p="http://schemas.openxmlformats.org/presentationml/2006/main">
+  <p:cSld>
+    <p:spTree>
+      <p:nvGrpSpPr>
         <p:cNvPr id="1" name="Shape 897"/>
         <p:cNvGrpSpPr/>
         <p:nvPr/>

</xml_diff>